<commit_message>
Advanced with pptx, modified figure inside synthesis
</commit_message>
<xml_diff>
--- a/Coposescu_Mihai_Octavian_prezentare.pptx
+++ b/Coposescu_Mihai_Octavian_prezentare.pptx
@@ -7,6 +7,14 @@
   <p:sldIdLst>
     <p:sldId id="256" r:id="rId2"/>
     <p:sldId id="257" r:id="rId3"/>
+    <p:sldId id="258" r:id="rId4"/>
+    <p:sldId id="259" r:id="rId5"/>
+    <p:sldId id="260" r:id="rId6"/>
+    <p:sldId id="261" r:id="rId7"/>
+    <p:sldId id="262" r:id="rId8"/>
+    <p:sldId id="263" r:id="rId9"/>
+    <p:sldId id="264" r:id="rId10"/>
+    <p:sldId id="265" r:id="rId11"/>
   </p:sldIdLst>
   <p:sldSz cx="12192000" cy="6858000"/>
   <p:notesSz cx="6858000" cy="9144000"/>
@@ -105,6 +113,11 @@
       </a:defRPr>
     </a:lvl9pPr>
   </p:defaultTextStyle>
+  <p:extLst>
+    <p:ext uri="{EFAFB233-063F-42B5-8137-9DF3F51BA10A}">
+      <p15:sldGuideLst xmlns:p15="http://schemas.microsoft.com/office/powerpoint/2012/main"/>
+    </p:ext>
+  </p:extLst>
 </p:presentation>
 </file>
 
@@ -257,7 +270,7 @@
           <a:p>
             <a:fld id="{4A65FBF5-449C-444B-A30D-7871BA1ECC0D}" type="datetimeFigureOut">
               <a:rPr lang="ro-RO" smtClean="0"/>
-              <a:t>28.08.2024</a:t>
+              <a:t>29.08.2024</a:t>
             </a:fld>
             <a:endParaRPr lang="ro-RO"/>
           </a:p>
@@ -457,7 +470,7 @@
           <a:p>
             <a:fld id="{4A65FBF5-449C-444B-A30D-7871BA1ECC0D}" type="datetimeFigureOut">
               <a:rPr lang="ro-RO" smtClean="0"/>
-              <a:t>28.08.2024</a:t>
+              <a:t>29.08.2024</a:t>
             </a:fld>
             <a:endParaRPr lang="ro-RO"/>
           </a:p>
@@ -667,7 +680,7 @@
           <a:p>
             <a:fld id="{4A65FBF5-449C-444B-A30D-7871BA1ECC0D}" type="datetimeFigureOut">
               <a:rPr lang="ro-RO" smtClean="0"/>
-              <a:t>28.08.2024</a:t>
+              <a:t>29.08.2024</a:t>
             </a:fld>
             <a:endParaRPr lang="ro-RO"/>
           </a:p>
@@ -867,7 +880,7 @@
           <a:p>
             <a:fld id="{4A65FBF5-449C-444B-A30D-7871BA1ECC0D}" type="datetimeFigureOut">
               <a:rPr lang="ro-RO" smtClean="0"/>
-              <a:t>28.08.2024</a:t>
+              <a:t>29.08.2024</a:t>
             </a:fld>
             <a:endParaRPr lang="ro-RO"/>
           </a:p>
@@ -1143,7 +1156,7 @@
           <a:p>
             <a:fld id="{4A65FBF5-449C-444B-A30D-7871BA1ECC0D}" type="datetimeFigureOut">
               <a:rPr lang="ro-RO" smtClean="0"/>
-              <a:t>28.08.2024</a:t>
+              <a:t>29.08.2024</a:t>
             </a:fld>
             <a:endParaRPr lang="ro-RO"/>
           </a:p>
@@ -1411,7 +1424,7 @@
           <a:p>
             <a:fld id="{4A65FBF5-449C-444B-A30D-7871BA1ECC0D}" type="datetimeFigureOut">
               <a:rPr lang="ro-RO" smtClean="0"/>
-              <a:t>28.08.2024</a:t>
+              <a:t>29.08.2024</a:t>
             </a:fld>
             <a:endParaRPr lang="ro-RO"/>
           </a:p>
@@ -1826,7 +1839,7 @@
           <a:p>
             <a:fld id="{4A65FBF5-449C-444B-A30D-7871BA1ECC0D}" type="datetimeFigureOut">
               <a:rPr lang="ro-RO" smtClean="0"/>
-              <a:t>28.08.2024</a:t>
+              <a:t>29.08.2024</a:t>
             </a:fld>
             <a:endParaRPr lang="ro-RO"/>
           </a:p>
@@ -1968,7 +1981,7 @@
           <a:p>
             <a:fld id="{4A65FBF5-449C-444B-A30D-7871BA1ECC0D}" type="datetimeFigureOut">
               <a:rPr lang="ro-RO" smtClean="0"/>
-              <a:t>28.08.2024</a:t>
+              <a:t>29.08.2024</a:t>
             </a:fld>
             <a:endParaRPr lang="ro-RO"/>
           </a:p>
@@ -2081,7 +2094,7 @@
           <a:p>
             <a:fld id="{4A65FBF5-449C-444B-A30D-7871BA1ECC0D}" type="datetimeFigureOut">
               <a:rPr lang="ro-RO" smtClean="0"/>
-              <a:t>28.08.2024</a:t>
+              <a:t>29.08.2024</a:t>
             </a:fld>
             <a:endParaRPr lang="ro-RO"/>
           </a:p>
@@ -2394,7 +2407,7 @@
           <a:p>
             <a:fld id="{4A65FBF5-449C-444B-A30D-7871BA1ECC0D}" type="datetimeFigureOut">
               <a:rPr lang="ro-RO" smtClean="0"/>
-              <a:t>28.08.2024</a:t>
+              <a:t>29.08.2024</a:t>
             </a:fld>
             <a:endParaRPr lang="ro-RO"/>
           </a:p>
@@ -2683,7 +2696,7 @@
           <a:p>
             <a:fld id="{4A65FBF5-449C-444B-A30D-7871BA1ECC0D}" type="datetimeFigureOut">
               <a:rPr lang="ro-RO" smtClean="0"/>
-              <a:t>28.08.2024</a:t>
+              <a:t>29.08.2024</a:t>
             </a:fld>
             <a:endParaRPr lang="ro-RO"/>
           </a:p>
@@ -2926,7 +2939,7 @@
           <a:p>
             <a:fld id="{4A65FBF5-449C-444B-A30D-7871BA1ECC0D}" type="datetimeFigureOut">
               <a:rPr lang="ro-RO" smtClean="0"/>
-              <a:t>28.08.2024</a:t>
+              <a:t>29.08.2024</a:t>
             </a:fld>
             <a:endParaRPr lang="ro-RO"/>
           </a:p>
@@ -3424,6 +3437,90 @@
 </p:sld>
 </file>
 
+<file path=ppt/slides/slide10.xml><?xml version="1.0" encoding="utf-8"?>
+<p:sld xmlns:a="http://schemas.openxmlformats.org/drawingml/2006/main" xmlns:r="http://schemas.openxmlformats.org/officeDocument/2006/relationships" xmlns:p="http://schemas.openxmlformats.org/presentationml/2006/main">
+  <p:cSld>
+    <p:spTree>
+      <p:nvGrpSpPr>
+        <p:cNvPr id="1" name=""/>
+        <p:cNvGrpSpPr/>
+        <p:nvPr/>
+      </p:nvGrpSpPr>
+      <p:grpSpPr>
+        <a:xfrm>
+          <a:off x="0" y="0"/>
+          <a:ext cx="0" cy="0"/>
+          <a:chOff x="0" y="0"/>
+          <a:chExt cx="0" cy="0"/>
+        </a:xfrm>
+      </p:grpSpPr>
+      <p:sp>
+        <p:nvSpPr>
+          <p:cNvPr id="2" name="Title 1">
+            <a:extLst>
+              <a:ext uri="{FF2B5EF4-FFF2-40B4-BE49-F238E27FC236}">
+                <a16:creationId xmlns:a16="http://schemas.microsoft.com/office/drawing/2014/main" id="{73CE673C-ABB5-E390-1078-C2EFE4185B61}"/>
+              </a:ext>
+            </a:extLst>
+          </p:cNvPr>
+          <p:cNvSpPr>
+            <a:spLocks noGrp="1"/>
+          </p:cNvSpPr>
+          <p:nvPr>
+            <p:ph type="title"/>
+          </p:nvPr>
+        </p:nvSpPr>
+        <p:spPr/>
+        <p:txBody>
+          <a:bodyPr/>
+          <a:lstStyle/>
+          <a:p>
+            <a:r>
+              <a:rPr lang="en-US" dirty="0" err="1"/>
+              <a:t>Bibliografie</a:t>
+            </a:r>
+            <a:endParaRPr lang="ro-RO" dirty="0"/>
+          </a:p>
+        </p:txBody>
+      </p:sp>
+      <p:sp>
+        <p:nvSpPr>
+          <p:cNvPr id="3" name="Content Placeholder 2">
+            <a:extLst>
+              <a:ext uri="{FF2B5EF4-FFF2-40B4-BE49-F238E27FC236}">
+                <a16:creationId xmlns:a16="http://schemas.microsoft.com/office/drawing/2014/main" id="{D678BB4F-7B65-5385-3463-D9585AFC35D6}"/>
+              </a:ext>
+            </a:extLst>
+          </p:cNvPr>
+          <p:cNvSpPr>
+            <a:spLocks noGrp="1"/>
+          </p:cNvSpPr>
+          <p:nvPr>
+            <p:ph idx="1"/>
+          </p:nvPr>
+        </p:nvSpPr>
+        <p:spPr/>
+        <p:txBody>
+          <a:bodyPr/>
+          <a:lstStyle/>
+          <a:p>
+            <a:endParaRPr lang="ro-RO"/>
+          </a:p>
+        </p:txBody>
+      </p:sp>
+    </p:spTree>
+    <p:extLst>
+      <p:ext uri="{BB962C8B-B14F-4D97-AF65-F5344CB8AC3E}">
+        <p14:creationId xmlns:p14="http://schemas.microsoft.com/office/powerpoint/2010/main" val="3144496577"/>
+      </p:ext>
+    </p:extLst>
+  </p:cSld>
+  <p:clrMapOvr>
+    <a:masterClrMapping/>
+  </p:clrMapOvr>
+</p:sld>
+</file>
+
 <file path=ppt/slides/slide2.xml><?xml version="1.0" encoding="utf-8"?>
 <p:sld xmlns:a="http://schemas.openxmlformats.org/drawingml/2006/main" xmlns:r="http://schemas.openxmlformats.org/officeDocument/2006/relationships" xmlns:p="http://schemas.openxmlformats.org/presentationml/2006/main">
   <p:cSld>
@@ -3608,6 +3705,854 @@
     <p:extLst>
       <p:ext uri="{BB962C8B-B14F-4D97-AF65-F5344CB8AC3E}">
         <p14:creationId xmlns:p14="http://schemas.microsoft.com/office/powerpoint/2010/main" val="564963265"/>
+      </p:ext>
+    </p:extLst>
+  </p:cSld>
+  <p:clrMapOvr>
+    <a:masterClrMapping/>
+  </p:clrMapOvr>
+</p:sld>
+</file>
+
+<file path=ppt/slides/slide3.xml><?xml version="1.0" encoding="utf-8"?>
+<p:sld xmlns:a="http://schemas.openxmlformats.org/drawingml/2006/main" xmlns:r="http://schemas.openxmlformats.org/officeDocument/2006/relationships" xmlns:p="http://schemas.openxmlformats.org/presentationml/2006/main">
+  <p:cSld>
+    <p:spTree>
+      <p:nvGrpSpPr>
+        <p:cNvPr id="1" name=""/>
+        <p:cNvGrpSpPr/>
+        <p:nvPr/>
+      </p:nvGrpSpPr>
+      <p:grpSpPr>
+        <a:xfrm>
+          <a:off x="0" y="0"/>
+          <a:ext cx="0" cy="0"/>
+          <a:chOff x="0" y="0"/>
+          <a:chExt cx="0" cy="0"/>
+        </a:xfrm>
+      </p:grpSpPr>
+      <p:sp>
+        <p:nvSpPr>
+          <p:cNvPr id="2" name="Title 1">
+            <a:extLst>
+              <a:ext uri="{FF2B5EF4-FFF2-40B4-BE49-F238E27FC236}">
+                <a16:creationId xmlns:a16="http://schemas.microsoft.com/office/drawing/2014/main" id="{4D26A0CF-23B9-CBCB-FD8A-628F4EE14BF7}"/>
+              </a:ext>
+            </a:extLst>
+          </p:cNvPr>
+          <p:cNvSpPr>
+            <a:spLocks noGrp="1"/>
+          </p:cNvSpPr>
+          <p:nvPr>
+            <p:ph type="title"/>
+          </p:nvPr>
+        </p:nvSpPr>
+        <p:spPr/>
+        <p:txBody>
+          <a:bodyPr/>
+          <a:lstStyle/>
+          <a:p>
+            <a:r>
+              <a:rPr lang="en-US" dirty="0" err="1"/>
+              <a:t>Contextul</a:t>
+            </a:r>
+            <a:r>
+              <a:rPr lang="en-US" dirty="0"/>
+              <a:t> </a:t>
+            </a:r>
+            <a:r>
+              <a:rPr lang="en-US" dirty="0" err="1"/>
+              <a:t>proiectului</a:t>
+            </a:r>
+            <a:endParaRPr lang="ro-RO" dirty="0"/>
+          </a:p>
+        </p:txBody>
+      </p:sp>
+      <p:sp>
+        <p:nvSpPr>
+          <p:cNvPr id="3" name="Content Placeholder 2">
+            <a:extLst>
+              <a:ext uri="{FF2B5EF4-FFF2-40B4-BE49-F238E27FC236}">
+                <a16:creationId xmlns:a16="http://schemas.microsoft.com/office/drawing/2014/main" id="{25F5D5F8-846D-F14D-112E-348F7635FAFA}"/>
+              </a:ext>
+            </a:extLst>
+          </p:cNvPr>
+          <p:cNvSpPr>
+            <a:spLocks noGrp="1"/>
+          </p:cNvSpPr>
+          <p:nvPr>
+            <p:ph idx="1"/>
+          </p:nvPr>
+        </p:nvSpPr>
+        <p:spPr/>
+        <p:txBody>
+          <a:bodyPr/>
+          <a:lstStyle/>
+          <a:p>
+            <a:r>
+              <a:rPr lang="en-US" dirty="0"/>
+              <a:t>Cum ne </a:t>
+            </a:r>
+            <a:r>
+              <a:rPr lang="en-US" dirty="0" err="1"/>
+              <a:t>afecteaza</a:t>
+            </a:r>
+            <a:r>
+              <a:rPr lang="en-US" dirty="0"/>
+              <a:t> </a:t>
+            </a:r>
+            <a:r>
+              <a:rPr lang="en-US" dirty="0" err="1"/>
+              <a:t>calitatea</a:t>
+            </a:r>
+            <a:r>
+              <a:rPr lang="en-US" dirty="0"/>
+              <a:t> </a:t>
+            </a:r>
+            <a:r>
+              <a:rPr lang="en-US" dirty="0" err="1"/>
+              <a:t>aerului</a:t>
+            </a:r>
+            <a:r>
+              <a:rPr lang="en-US" dirty="0"/>
+              <a:t>?</a:t>
+            </a:r>
+          </a:p>
+          <a:p>
+            <a:endParaRPr lang="en-US" dirty="0"/>
+          </a:p>
+          <a:p>
+            <a:r>
+              <a:rPr lang="en-US" dirty="0"/>
+              <a:t>90% din </a:t>
+            </a:r>
+            <a:r>
+              <a:rPr lang="en-US" dirty="0" err="1"/>
+              <a:t>timp</a:t>
+            </a:r>
+            <a:r>
+              <a:rPr lang="en-US" dirty="0"/>
+              <a:t> il </a:t>
+            </a:r>
+            <a:r>
+              <a:rPr lang="en-US" dirty="0" err="1"/>
+              <a:t>petrecem</a:t>
+            </a:r>
+            <a:r>
+              <a:rPr lang="en-US" dirty="0"/>
+              <a:t> in </a:t>
+            </a:r>
+            <a:r>
+              <a:rPr lang="en-US" dirty="0" err="1"/>
+              <a:t>spatii</a:t>
+            </a:r>
+            <a:r>
+              <a:rPr lang="en-US" dirty="0"/>
+              <a:t> </a:t>
+            </a:r>
+            <a:r>
+              <a:rPr lang="en-US" dirty="0" err="1"/>
+              <a:t>inchise</a:t>
+            </a:r>
+            <a:r>
+              <a:rPr lang="en-US" dirty="0"/>
+              <a:t>…</a:t>
+            </a:r>
+          </a:p>
+          <a:p>
+            <a:endParaRPr lang="en-US" dirty="0"/>
+          </a:p>
+        </p:txBody>
+      </p:sp>
+    </p:spTree>
+    <p:extLst>
+      <p:ext uri="{BB962C8B-B14F-4D97-AF65-F5344CB8AC3E}">
+        <p14:creationId xmlns:p14="http://schemas.microsoft.com/office/powerpoint/2010/main" val="4115932074"/>
+      </p:ext>
+    </p:extLst>
+  </p:cSld>
+  <p:clrMapOvr>
+    <a:masterClrMapping/>
+  </p:clrMapOvr>
+</p:sld>
+</file>
+
+<file path=ppt/slides/slide4.xml><?xml version="1.0" encoding="utf-8"?>
+<p:sld xmlns:a="http://schemas.openxmlformats.org/drawingml/2006/main" xmlns:r="http://schemas.openxmlformats.org/officeDocument/2006/relationships" xmlns:p="http://schemas.openxmlformats.org/presentationml/2006/main">
+  <p:cSld>
+    <p:spTree>
+      <p:nvGrpSpPr>
+        <p:cNvPr id="1" name=""/>
+        <p:cNvGrpSpPr/>
+        <p:nvPr/>
+      </p:nvGrpSpPr>
+      <p:grpSpPr>
+        <a:xfrm>
+          <a:off x="0" y="0"/>
+          <a:ext cx="0" cy="0"/>
+          <a:chOff x="0" y="0"/>
+          <a:chExt cx="0" cy="0"/>
+        </a:xfrm>
+      </p:grpSpPr>
+      <p:sp>
+        <p:nvSpPr>
+          <p:cNvPr id="2" name="Title 1">
+            <a:extLst>
+              <a:ext uri="{FF2B5EF4-FFF2-40B4-BE49-F238E27FC236}">
+                <a16:creationId xmlns:a16="http://schemas.microsoft.com/office/drawing/2014/main" id="{27ECA6F0-3737-5851-5131-BF1647EC5785}"/>
+              </a:ext>
+            </a:extLst>
+          </p:cNvPr>
+          <p:cNvSpPr>
+            <a:spLocks noGrp="1"/>
+          </p:cNvSpPr>
+          <p:nvPr>
+            <p:ph type="title"/>
+          </p:nvPr>
+        </p:nvSpPr>
+        <p:spPr/>
+        <p:txBody>
+          <a:bodyPr/>
+          <a:lstStyle/>
+          <a:p>
+            <a:r>
+              <a:rPr lang="en-US" dirty="0" err="1"/>
+              <a:t>Obiectivele</a:t>
+            </a:r>
+            <a:r>
+              <a:rPr lang="en-US" dirty="0"/>
+              <a:t> </a:t>
+            </a:r>
+            <a:r>
+              <a:rPr lang="en-US" dirty="0" err="1"/>
+              <a:t>proiectului</a:t>
+            </a:r>
+            <a:endParaRPr lang="ro-RO" dirty="0"/>
+          </a:p>
+        </p:txBody>
+      </p:sp>
+      <p:sp>
+        <p:nvSpPr>
+          <p:cNvPr id="3" name="Content Placeholder 2">
+            <a:extLst>
+              <a:ext uri="{FF2B5EF4-FFF2-40B4-BE49-F238E27FC236}">
+                <a16:creationId xmlns:a16="http://schemas.microsoft.com/office/drawing/2014/main" id="{E9E0E924-EEFD-A168-015B-4A339C14F93D}"/>
+              </a:ext>
+            </a:extLst>
+          </p:cNvPr>
+          <p:cNvSpPr>
+            <a:spLocks noGrp="1"/>
+          </p:cNvSpPr>
+          <p:nvPr>
+            <p:ph idx="1"/>
+          </p:nvPr>
+        </p:nvSpPr>
+        <p:spPr/>
+        <p:txBody>
+          <a:bodyPr/>
+          <a:lstStyle/>
+          <a:p>
+            <a:r>
+              <a:rPr lang="en-US" dirty="0" err="1"/>
+              <a:t>Masurarea</a:t>
+            </a:r>
+            <a:r>
+              <a:rPr lang="en-US" dirty="0"/>
+              <a:t> </a:t>
+            </a:r>
+            <a:r>
+              <a:rPr lang="en-US" dirty="0" err="1"/>
+              <a:t>parametrilor</a:t>
+            </a:r>
+            <a:r>
+              <a:rPr lang="en-US" dirty="0"/>
+              <a:t> </a:t>
+            </a:r>
+            <a:r>
+              <a:rPr lang="en-US" dirty="0" err="1"/>
+              <a:t>cheie</a:t>
+            </a:r>
+            <a:r>
+              <a:rPr lang="en-US" dirty="0"/>
+              <a:t> de </a:t>
+            </a:r>
+            <a:r>
+              <a:rPr lang="en-US" dirty="0" err="1"/>
+              <a:t>calitate</a:t>
+            </a:r>
+            <a:r>
+              <a:rPr lang="en-US" dirty="0"/>
+              <a:t> a </a:t>
+            </a:r>
+            <a:r>
+              <a:rPr lang="en-US" dirty="0" err="1"/>
+              <a:t>aerului</a:t>
+            </a:r>
+            <a:r>
+              <a:rPr lang="en-US" dirty="0"/>
+              <a:t>.</a:t>
+            </a:r>
+          </a:p>
+          <a:p>
+            <a:r>
+              <a:rPr lang="en-US" dirty="0" err="1"/>
+              <a:t>Citirea</a:t>
+            </a:r>
+            <a:r>
+              <a:rPr lang="en-US" dirty="0"/>
+              <a:t> </a:t>
+            </a:r>
+            <a:r>
+              <a:rPr lang="en-US" dirty="0" err="1"/>
+              <a:t>parametrilor</a:t>
+            </a:r>
+            <a:r>
+              <a:rPr lang="en-US" dirty="0"/>
+              <a:t> in </a:t>
+            </a:r>
+            <a:r>
+              <a:rPr lang="en-US" dirty="0" err="1"/>
+              <a:t>timp</a:t>
+            </a:r>
+            <a:r>
+              <a:rPr lang="en-US" dirty="0"/>
+              <a:t> real.</a:t>
+            </a:r>
+          </a:p>
+          <a:p>
+            <a:r>
+              <a:rPr lang="en-US" dirty="0" err="1"/>
+              <a:t>Citirea</a:t>
+            </a:r>
+            <a:r>
+              <a:rPr lang="en-US" dirty="0"/>
+              <a:t> </a:t>
+            </a:r>
+            <a:r>
+              <a:rPr lang="en-US" dirty="0" err="1"/>
+              <a:t>parametrilor</a:t>
+            </a:r>
+            <a:r>
+              <a:rPr lang="en-US" dirty="0"/>
+              <a:t> </a:t>
+            </a:r>
+            <a:r>
+              <a:rPr lang="en-US" dirty="0" err="1"/>
+              <a:t>istorici</a:t>
+            </a:r>
+            <a:r>
+              <a:rPr lang="en-US" dirty="0"/>
+              <a:t>.</a:t>
+            </a:r>
+          </a:p>
+          <a:p>
+            <a:r>
+              <a:rPr lang="en-US" dirty="0" err="1"/>
+              <a:t>Oferirea</a:t>
+            </a:r>
+            <a:r>
+              <a:rPr lang="en-US" dirty="0"/>
+              <a:t> </a:t>
+            </a:r>
+            <a:r>
+              <a:rPr lang="en-US" dirty="0" err="1"/>
+              <a:t>unei</a:t>
+            </a:r>
+            <a:r>
+              <a:rPr lang="en-US" dirty="0"/>
+              <a:t> </a:t>
+            </a:r>
+            <a:r>
+              <a:rPr lang="en-US" dirty="0" err="1"/>
+              <a:t>interfete</a:t>
+            </a:r>
+            <a:r>
+              <a:rPr lang="en-US" dirty="0"/>
+              <a:t> intuitive </a:t>
+            </a:r>
+            <a:r>
+              <a:rPr lang="en-US" dirty="0" err="1"/>
+              <a:t>si</a:t>
+            </a:r>
+            <a:r>
+              <a:rPr lang="en-US" dirty="0"/>
+              <a:t> </a:t>
+            </a:r>
+            <a:r>
+              <a:rPr lang="en-US" dirty="0" err="1"/>
+              <a:t>usor</a:t>
+            </a:r>
+            <a:r>
+              <a:rPr lang="en-US" dirty="0"/>
+              <a:t> de </a:t>
+            </a:r>
+            <a:r>
+              <a:rPr lang="en-US" dirty="0" err="1"/>
+              <a:t>utilizat</a:t>
+            </a:r>
+            <a:r>
+              <a:rPr lang="en-US" dirty="0"/>
+              <a:t>.</a:t>
+            </a:r>
+          </a:p>
+        </p:txBody>
+      </p:sp>
+    </p:spTree>
+    <p:extLst>
+      <p:ext uri="{BB962C8B-B14F-4D97-AF65-F5344CB8AC3E}">
+        <p14:creationId xmlns:p14="http://schemas.microsoft.com/office/powerpoint/2010/main" val="3667742493"/>
+      </p:ext>
+    </p:extLst>
+  </p:cSld>
+  <p:clrMapOvr>
+    <a:masterClrMapping/>
+  </p:clrMapOvr>
+</p:sld>
+</file>
+
+<file path=ppt/slides/slide5.xml><?xml version="1.0" encoding="utf-8"?>
+<p:sld xmlns:a="http://schemas.openxmlformats.org/drawingml/2006/main" xmlns:r="http://schemas.openxmlformats.org/officeDocument/2006/relationships" xmlns:p="http://schemas.openxmlformats.org/presentationml/2006/main">
+  <p:cSld>
+    <p:spTree>
+      <p:nvGrpSpPr>
+        <p:cNvPr id="1" name=""/>
+        <p:cNvGrpSpPr/>
+        <p:nvPr/>
+      </p:nvGrpSpPr>
+      <p:grpSpPr>
+        <a:xfrm>
+          <a:off x="0" y="0"/>
+          <a:ext cx="0" cy="0"/>
+          <a:chOff x="0" y="0"/>
+          <a:chExt cx="0" cy="0"/>
+        </a:xfrm>
+      </p:grpSpPr>
+      <p:sp>
+        <p:nvSpPr>
+          <p:cNvPr id="2" name="Title 1">
+            <a:extLst>
+              <a:ext uri="{FF2B5EF4-FFF2-40B4-BE49-F238E27FC236}">
+                <a16:creationId xmlns:a16="http://schemas.microsoft.com/office/drawing/2014/main" id="{78C9C6DE-38BE-CB03-8564-E33D6000A78B}"/>
+              </a:ext>
+            </a:extLst>
+          </p:cNvPr>
+          <p:cNvSpPr>
+            <a:spLocks noGrp="1"/>
+          </p:cNvSpPr>
+          <p:nvPr>
+            <p:ph type="title"/>
+          </p:nvPr>
+        </p:nvSpPr>
+        <p:spPr/>
+        <p:txBody>
+          <a:bodyPr/>
+          <a:lstStyle/>
+          <a:p>
+            <a:r>
+              <a:rPr lang="en-US" dirty="0" err="1"/>
+              <a:t>Studiu</a:t>
+            </a:r>
+            <a:r>
+              <a:rPr lang="en-US" dirty="0"/>
+              <a:t> </a:t>
+            </a:r>
+            <a:r>
+              <a:rPr lang="en-US" dirty="0" err="1"/>
+              <a:t>bibliografic</a:t>
+            </a:r>
+            <a:endParaRPr lang="ro-RO" dirty="0"/>
+          </a:p>
+        </p:txBody>
+      </p:sp>
+      <p:sp>
+        <p:nvSpPr>
+          <p:cNvPr id="3" name="Content Placeholder 2">
+            <a:extLst>
+              <a:ext uri="{FF2B5EF4-FFF2-40B4-BE49-F238E27FC236}">
+                <a16:creationId xmlns:a16="http://schemas.microsoft.com/office/drawing/2014/main" id="{8E633011-8E75-B02B-EA53-91BC1AAA2976}"/>
+              </a:ext>
+            </a:extLst>
+          </p:cNvPr>
+          <p:cNvSpPr>
+            <a:spLocks noGrp="1"/>
+          </p:cNvSpPr>
+          <p:nvPr>
+            <p:ph idx="1"/>
+          </p:nvPr>
+        </p:nvSpPr>
+        <p:spPr/>
+        <p:txBody>
+          <a:bodyPr/>
+          <a:lstStyle/>
+          <a:p>
+            <a:endParaRPr lang="ro-RO" dirty="0"/>
+          </a:p>
+        </p:txBody>
+      </p:sp>
+    </p:spTree>
+    <p:extLst>
+      <p:ext uri="{BB962C8B-B14F-4D97-AF65-F5344CB8AC3E}">
+        <p14:creationId xmlns:p14="http://schemas.microsoft.com/office/powerpoint/2010/main" val="4154750964"/>
+      </p:ext>
+    </p:extLst>
+  </p:cSld>
+  <p:clrMapOvr>
+    <a:masterClrMapping/>
+  </p:clrMapOvr>
+</p:sld>
+</file>
+
+<file path=ppt/slides/slide6.xml><?xml version="1.0" encoding="utf-8"?>
+<p:sld xmlns:a="http://schemas.openxmlformats.org/drawingml/2006/main" xmlns:r="http://schemas.openxmlformats.org/officeDocument/2006/relationships" xmlns:p="http://schemas.openxmlformats.org/presentationml/2006/main">
+  <p:cSld>
+    <p:spTree>
+      <p:nvGrpSpPr>
+        <p:cNvPr id="1" name=""/>
+        <p:cNvGrpSpPr/>
+        <p:nvPr/>
+      </p:nvGrpSpPr>
+      <p:grpSpPr>
+        <a:xfrm>
+          <a:off x="0" y="0"/>
+          <a:ext cx="0" cy="0"/>
+          <a:chOff x="0" y="0"/>
+          <a:chExt cx="0" cy="0"/>
+        </a:xfrm>
+      </p:grpSpPr>
+      <p:sp>
+        <p:nvSpPr>
+          <p:cNvPr id="2" name="Title 1">
+            <a:extLst>
+              <a:ext uri="{FF2B5EF4-FFF2-40B4-BE49-F238E27FC236}">
+                <a16:creationId xmlns:a16="http://schemas.microsoft.com/office/drawing/2014/main" id="{6904E23F-4F4C-6883-0247-537005388729}"/>
+              </a:ext>
+            </a:extLst>
+          </p:cNvPr>
+          <p:cNvSpPr>
+            <a:spLocks noGrp="1"/>
+          </p:cNvSpPr>
+          <p:nvPr>
+            <p:ph type="title"/>
+          </p:nvPr>
+        </p:nvSpPr>
+        <p:spPr/>
+        <p:txBody>
+          <a:bodyPr/>
+          <a:lstStyle/>
+          <a:p>
+            <a:r>
+              <a:rPr lang="en-US" dirty="0"/>
+              <a:t>Solutia </a:t>
+            </a:r>
+            <a:r>
+              <a:rPr lang="en-US" dirty="0" err="1"/>
+              <a:t>Aleasa</a:t>
+            </a:r>
+            <a:endParaRPr lang="ro-RO" dirty="0"/>
+          </a:p>
+        </p:txBody>
+      </p:sp>
+      <p:sp>
+        <p:nvSpPr>
+          <p:cNvPr id="3" name="Content Placeholder 2">
+            <a:extLst>
+              <a:ext uri="{FF2B5EF4-FFF2-40B4-BE49-F238E27FC236}">
+                <a16:creationId xmlns:a16="http://schemas.microsoft.com/office/drawing/2014/main" id="{7105036C-C24C-F59E-83AF-B69E1DD13616}"/>
+              </a:ext>
+            </a:extLst>
+          </p:cNvPr>
+          <p:cNvSpPr>
+            <a:spLocks noGrp="1"/>
+          </p:cNvSpPr>
+          <p:nvPr>
+            <p:ph idx="1"/>
+          </p:nvPr>
+        </p:nvSpPr>
+        <p:spPr/>
+        <p:txBody>
+          <a:bodyPr/>
+          <a:lstStyle/>
+          <a:p>
+            <a:endParaRPr lang="ro-RO"/>
+          </a:p>
+        </p:txBody>
+      </p:sp>
+    </p:spTree>
+    <p:extLst>
+      <p:ext uri="{BB962C8B-B14F-4D97-AF65-F5344CB8AC3E}">
+        <p14:creationId xmlns:p14="http://schemas.microsoft.com/office/powerpoint/2010/main" val="820083394"/>
+      </p:ext>
+    </p:extLst>
+  </p:cSld>
+  <p:clrMapOvr>
+    <a:masterClrMapping/>
+  </p:clrMapOvr>
+</p:sld>
+</file>
+
+<file path=ppt/slides/slide7.xml><?xml version="1.0" encoding="utf-8"?>
+<p:sld xmlns:a="http://schemas.openxmlformats.org/drawingml/2006/main" xmlns:r="http://schemas.openxmlformats.org/officeDocument/2006/relationships" xmlns:p="http://schemas.openxmlformats.org/presentationml/2006/main">
+  <p:cSld>
+    <p:spTree>
+      <p:nvGrpSpPr>
+        <p:cNvPr id="1" name=""/>
+        <p:cNvGrpSpPr/>
+        <p:nvPr/>
+      </p:nvGrpSpPr>
+      <p:grpSpPr>
+        <a:xfrm>
+          <a:off x="0" y="0"/>
+          <a:ext cx="0" cy="0"/>
+          <a:chOff x="0" y="0"/>
+          <a:chExt cx="0" cy="0"/>
+        </a:xfrm>
+      </p:grpSpPr>
+      <p:sp>
+        <p:nvSpPr>
+          <p:cNvPr id="2" name="Title 1">
+            <a:extLst>
+              <a:ext uri="{FF2B5EF4-FFF2-40B4-BE49-F238E27FC236}">
+                <a16:creationId xmlns:a16="http://schemas.microsoft.com/office/drawing/2014/main" id="{EF5FD5CF-C8DD-252A-2FA5-02978D23B94F}"/>
+              </a:ext>
+            </a:extLst>
+          </p:cNvPr>
+          <p:cNvSpPr>
+            <a:spLocks noGrp="1"/>
+          </p:cNvSpPr>
+          <p:nvPr>
+            <p:ph type="title"/>
+          </p:nvPr>
+        </p:nvSpPr>
+        <p:spPr/>
+        <p:txBody>
+          <a:bodyPr/>
+          <a:lstStyle/>
+          <a:p>
+            <a:r>
+              <a:rPr lang="en-US" dirty="0" err="1"/>
+              <a:t>Implementarea</a:t>
+            </a:r>
+            <a:r>
+              <a:rPr lang="en-US" dirty="0"/>
+              <a:t> </a:t>
+            </a:r>
+            <a:r>
+              <a:rPr lang="en-US" dirty="0" err="1"/>
+              <a:t>solutiei</a:t>
+            </a:r>
+            <a:endParaRPr lang="ro-RO" dirty="0"/>
+          </a:p>
+        </p:txBody>
+      </p:sp>
+      <p:sp>
+        <p:nvSpPr>
+          <p:cNvPr id="3" name="Content Placeholder 2">
+            <a:extLst>
+              <a:ext uri="{FF2B5EF4-FFF2-40B4-BE49-F238E27FC236}">
+                <a16:creationId xmlns:a16="http://schemas.microsoft.com/office/drawing/2014/main" id="{9131BEB1-C4A9-E428-C049-360B7CE0A617}"/>
+              </a:ext>
+            </a:extLst>
+          </p:cNvPr>
+          <p:cNvSpPr>
+            <a:spLocks noGrp="1"/>
+          </p:cNvSpPr>
+          <p:nvPr>
+            <p:ph idx="1"/>
+          </p:nvPr>
+        </p:nvSpPr>
+        <p:spPr/>
+        <p:txBody>
+          <a:bodyPr/>
+          <a:lstStyle/>
+          <a:p>
+            <a:endParaRPr lang="ro-RO"/>
+          </a:p>
+        </p:txBody>
+      </p:sp>
+    </p:spTree>
+    <p:extLst>
+      <p:ext uri="{BB962C8B-B14F-4D97-AF65-F5344CB8AC3E}">
+        <p14:creationId xmlns:p14="http://schemas.microsoft.com/office/powerpoint/2010/main" val="1392760137"/>
+      </p:ext>
+    </p:extLst>
+  </p:cSld>
+  <p:clrMapOvr>
+    <a:masterClrMapping/>
+  </p:clrMapOvr>
+</p:sld>
+</file>
+
+<file path=ppt/slides/slide8.xml><?xml version="1.0" encoding="utf-8"?>
+<p:sld xmlns:a="http://schemas.openxmlformats.org/drawingml/2006/main" xmlns:r="http://schemas.openxmlformats.org/officeDocument/2006/relationships" xmlns:p="http://schemas.openxmlformats.org/presentationml/2006/main">
+  <p:cSld>
+    <p:spTree>
+      <p:nvGrpSpPr>
+        <p:cNvPr id="1" name=""/>
+        <p:cNvGrpSpPr/>
+        <p:nvPr/>
+      </p:nvGrpSpPr>
+      <p:grpSpPr>
+        <a:xfrm>
+          <a:off x="0" y="0"/>
+          <a:ext cx="0" cy="0"/>
+          <a:chOff x="0" y="0"/>
+          <a:chExt cx="0" cy="0"/>
+        </a:xfrm>
+      </p:grpSpPr>
+      <p:sp>
+        <p:nvSpPr>
+          <p:cNvPr id="2" name="Title 1">
+            <a:extLst>
+              <a:ext uri="{FF2B5EF4-FFF2-40B4-BE49-F238E27FC236}">
+                <a16:creationId xmlns:a16="http://schemas.microsoft.com/office/drawing/2014/main" id="{B9DAA0C3-85C1-956C-1F71-77B73911381A}"/>
+              </a:ext>
+            </a:extLst>
+          </p:cNvPr>
+          <p:cNvSpPr>
+            <a:spLocks noGrp="1"/>
+          </p:cNvSpPr>
+          <p:nvPr>
+            <p:ph type="title"/>
+          </p:nvPr>
+        </p:nvSpPr>
+        <p:spPr/>
+        <p:txBody>
+          <a:bodyPr/>
+          <a:lstStyle/>
+          <a:p>
+            <a:r>
+              <a:rPr lang="en-US" dirty="0"/>
+              <a:t>Teste </a:t>
+            </a:r>
+            <a:r>
+              <a:rPr lang="en-US" dirty="0" err="1"/>
+              <a:t>si</a:t>
+            </a:r>
+            <a:r>
+              <a:rPr lang="en-US" dirty="0"/>
+              <a:t> </a:t>
+            </a:r>
+            <a:r>
+              <a:rPr lang="en-US" dirty="0" err="1"/>
+              <a:t>rezultate</a:t>
+            </a:r>
+            <a:endParaRPr lang="ro-RO" dirty="0"/>
+          </a:p>
+        </p:txBody>
+      </p:sp>
+      <p:sp>
+        <p:nvSpPr>
+          <p:cNvPr id="3" name="Content Placeholder 2">
+            <a:extLst>
+              <a:ext uri="{FF2B5EF4-FFF2-40B4-BE49-F238E27FC236}">
+                <a16:creationId xmlns:a16="http://schemas.microsoft.com/office/drawing/2014/main" id="{2AB9D4FD-FA42-282B-2C51-880BADDA3F35}"/>
+              </a:ext>
+            </a:extLst>
+          </p:cNvPr>
+          <p:cNvSpPr>
+            <a:spLocks noGrp="1"/>
+          </p:cNvSpPr>
+          <p:nvPr>
+            <p:ph idx="1"/>
+          </p:nvPr>
+        </p:nvSpPr>
+        <p:spPr/>
+        <p:txBody>
+          <a:bodyPr/>
+          <a:lstStyle/>
+          <a:p>
+            <a:endParaRPr lang="ro-RO"/>
+          </a:p>
+        </p:txBody>
+      </p:sp>
+    </p:spTree>
+    <p:extLst>
+      <p:ext uri="{BB962C8B-B14F-4D97-AF65-F5344CB8AC3E}">
+        <p14:creationId xmlns:p14="http://schemas.microsoft.com/office/powerpoint/2010/main" val="1167266706"/>
+      </p:ext>
+    </p:extLst>
+  </p:cSld>
+  <p:clrMapOvr>
+    <a:masterClrMapping/>
+  </p:clrMapOvr>
+</p:sld>
+</file>
+
+<file path=ppt/slides/slide9.xml><?xml version="1.0" encoding="utf-8"?>
+<p:sld xmlns:a="http://schemas.openxmlformats.org/drawingml/2006/main" xmlns:r="http://schemas.openxmlformats.org/officeDocument/2006/relationships" xmlns:p="http://schemas.openxmlformats.org/presentationml/2006/main">
+  <p:cSld>
+    <p:spTree>
+      <p:nvGrpSpPr>
+        <p:cNvPr id="1" name=""/>
+        <p:cNvGrpSpPr/>
+        <p:nvPr/>
+      </p:nvGrpSpPr>
+      <p:grpSpPr>
+        <a:xfrm>
+          <a:off x="0" y="0"/>
+          <a:ext cx="0" cy="0"/>
+          <a:chOff x="0" y="0"/>
+          <a:chExt cx="0" cy="0"/>
+        </a:xfrm>
+      </p:grpSpPr>
+      <p:sp>
+        <p:nvSpPr>
+          <p:cNvPr id="2" name="Title 1">
+            <a:extLst>
+              <a:ext uri="{FF2B5EF4-FFF2-40B4-BE49-F238E27FC236}">
+                <a16:creationId xmlns:a16="http://schemas.microsoft.com/office/drawing/2014/main" id="{7ED5A5CB-42BA-4E52-0E3D-2E6ED4C00485}"/>
+              </a:ext>
+            </a:extLst>
+          </p:cNvPr>
+          <p:cNvSpPr>
+            <a:spLocks noGrp="1"/>
+          </p:cNvSpPr>
+          <p:nvPr>
+            <p:ph type="title"/>
+          </p:nvPr>
+        </p:nvSpPr>
+        <p:spPr/>
+        <p:txBody>
+          <a:bodyPr/>
+          <a:lstStyle/>
+          <a:p>
+            <a:r>
+              <a:rPr lang="en-US" dirty="0" err="1"/>
+              <a:t>Concluzii</a:t>
+            </a:r>
+            <a:endParaRPr lang="ro-RO" dirty="0"/>
+          </a:p>
+        </p:txBody>
+      </p:sp>
+      <p:sp>
+        <p:nvSpPr>
+          <p:cNvPr id="3" name="Content Placeholder 2">
+            <a:extLst>
+              <a:ext uri="{FF2B5EF4-FFF2-40B4-BE49-F238E27FC236}">
+                <a16:creationId xmlns:a16="http://schemas.microsoft.com/office/drawing/2014/main" id="{930DA853-5CBC-7D9C-4AA8-86831CB8CE33}"/>
+              </a:ext>
+            </a:extLst>
+          </p:cNvPr>
+          <p:cNvSpPr>
+            <a:spLocks noGrp="1"/>
+          </p:cNvSpPr>
+          <p:nvPr>
+            <p:ph idx="1"/>
+          </p:nvPr>
+        </p:nvSpPr>
+        <p:spPr/>
+        <p:txBody>
+          <a:bodyPr/>
+          <a:lstStyle/>
+          <a:p>
+            <a:endParaRPr lang="ro-RO"/>
+          </a:p>
+        </p:txBody>
+      </p:sp>
+    </p:spTree>
+    <p:extLst>
+      <p:ext uri="{BB962C8B-B14F-4D97-AF65-F5344CB8AC3E}">
+        <p14:creationId xmlns:p14="http://schemas.microsoft.com/office/powerpoint/2010/main" val="736913998"/>
       </p:ext>
     </p:extLst>
   </p:cSld>

</xml_diff>

<commit_message>
Advanced with the prezentation
</commit_message>
<xml_diff>
--- a/Coposescu_Mihai_Octavian_prezentare.pptx
+++ b/Coposescu_Mihai_Octavian_prezentare.pptx
@@ -10,11 +10,19 @@
     <p:sldId id="258" r:id="rId4"/>
     <p:sldId id="259" r:id="rId5"/>
     <p:sldId id="260" r:id="rId6"/>
-    <p:sldId id="261" r:id="rId7"/>
-    <p:sldId id="262" r:id="rId8"/>
-    <p:sldId id="263" r:id="rId9"/>
-    <p:sldId id="264" r:id="rId10"/>
-    <p:sldId id="265" r:id="rId11"/>
+    <p:sldId id="266" r:id="rId7"/>
+    <p:sldId id="261" r:id="rId8"/>
+    <p:sldId id="267" r:id="rId9"/>
+    <p:sldId id="268" r:id="rId10"/>
+    <p:sldId id="262" r:id="rId11"/>
+    <p:sldId id="272" r:id="rId12"/>
+    <p:sldId id="269" r:id="rId13"/>
+    <p:sldId id="270" r:id="rId14"/>
+    <p:sldId id="271" r:id="rId15"/>
+    <p:sldId id="273" r:id="rId16"/>
+    <p:sldId id="263" r:id="rId17"/>
+    <p:sldId id="264" r:id="rId18"/>
+    <p:sldId id="265" r:id="rId19"/>
   </p:sldIdLst>
   <p:sldSz cx="12192000" cy="6858000"/>
   <p:notesSz cx="6858000" cy="9144000"/>
@@ -115,7 +123,13 @@
   </p:defaultTextStyle>
   <p:extLst>
     <p:ext uri="{EFAFB233-063F-42B5-8137-9DF3F51BA10A}">
-      <p15:sldGuideLst xmlns:p15="http://schemas.microsoft.com/office/powerpoint/2012/main"/>
+      <p15:sldGuideLst xmlns:p15="http://schemas.microsoft.com/office/powerpoint/2012/main">
+        <p15:guide id="1" orient="horz" pos="2160" userDrawn="1">
+          <p15:clr>
+            <a:srgbClr val="A4A3A4"/>
+          </p15:clr>
+        </p15:guide>
+      </p15:sldGuideLst>
     </p:ext>
   </p:extLst>
 </p:presentation>
@@ -270,7 +284,7 @@
           <a:p>
             <a:fld id="{4A65FBF5-449C-444B-A30D-7871BA1ECC0D}" type="datetimeFigureOut">
               <a:rPr lang="ro-RO" smtClean="0"/>
-              <a:t>29.08.2024</a:t>
+              <a:t>01.09.2024</a:t>
             </a:fld>
             <a:endParaRPr lang="ro-RO"/>
           </a:p>
@@ -470,7 +484,7 @@
           <a:p>
             <a:fld id="{4A65FBF5-449C-444B-A30D-7871BA1ECC0D}" type="datetimeFigureOut">
               <a:rPr lang="ro-RO" smtClean="0"/>
-              <a:t>29.08.2024</a:t>
+              <a:t>01.09.2024</a:t>
             </a:fld>
             <a:endParaRPr lang="ro-RO"/>
           </a:p>
@@ -680,7 +694,7 @@
           <a:p>
             <a:fld id="{4A65FBF5-449C-444B-A30D-7871BA1ECC0D}" type="datetimeFigureOut">
               <a:rPr lang="ro-RO" smtClean="0"/>
-              <a:t>29.08.2024</a:t>
+              <a:t>01.09.2024</a:t>
             </a:fld>
             <a:endParaRPr lang="ro-RO"/>
           </a:p>
@@ -880,7 +894,7 @@
           <a:p>
             <a:fld id="{4A65FBF5-449C-444B-A30D-7871BA1ECC0D}" type="datetimeFigureOut">
               <a:rPr lang="ro-RO" smtClean="0"/>
-              <a:t>29.08.2024</a:t>
+              <a:t>01.09.2024</a:t>
             </a:fld>
             <a:endParaRPr lang="ro-RO"/>
           </a:p>
@@ -1156,7 +1170,7 @@
           <a:p>
             <a:fld id="{4A65FBF5-449C-444B-A30D-7871BA1ECC0D}" type="datetimeFigureOut">
               <a:rPr lang="ro-RO" smtClean="0"/>
-              <a:t>29.08.2024</a:t>
+              <a:t>01.09.2024</a:t>
             </a:fld>
             <a:endParaRPr lang="ro-RO"/>
           </a:p>
@@ -1424,7 +1438,7 @@
           <a:p>
             <a:fld id="{4A65FBF5-449C-444B-A30D-7871BA1ECC0D}" type="datetimeFigureOut">
               <a:rPr lang="ro-RO" smtClean="0"/>
-              <a:t>29.08.2024</a:t>
+              <a:t>01.09.2024</a:t>
             </a:fld>
             <a:endParaRPr lang="ro-RO"/>
           </a:p>
@@ -1839,7 +1853,7 @@
           <a:p>
             <a:fld id="{4A65FBF5-449C-444B-A30D-7871BA1ECC0D}" type="datetimeFigureOut">
               <a:rPr lang="ro-RO" smtClean="0"/>
-              <a:t>29.08.2024</a:t>
+              <a:t>01.09.2024</a:t>
             </a:fld>
             <a:endParaRPr lang="ro-RO"/>
           </a:p>
@@ -1981,7 +1995,7 @@
           <a:p>
             <a:fld id="{4A65FBF5-449C-444B-A30D-7871BA1ECC0D}" type="datetimeFigureOut">
               <a:rPr lang="ro-RO" smtClean="0"/>
-              <a:t>29.08.2024</a:t>
+              <a:t>01.09.2024</a:t>
             </a:fld>
             <a:endParaRPr lang="ro-RO"/>
           </a:p>
@@ -2094,7 +2108,7 @@
           <a:p>
             <a:fld id="{4A65FBF5-449C-444B-A30D-7871BA1ECC0D}" type="datetimeFigureOut">
               <a:rPr lang="ro-RO" smtClean="0"/>
-              <a:t>29.08.2024</a:t>
+              <a:t>01.09.2024</a:t>
             </a:fld>
             <a:endParaRPr lang="ro-RO"/>
           </a:p>
@@ -2407,7 +2421,7 @@
           <a:p>
             <a:fld id="{4A65FBF5-449C-444B-A30D-7871BA1ECC0D}" type="datetimeFigureOut">
               <a:rPr lang="ro-RO" smtClean="0"/>
-              <a:t>29.08.2024</a:t>
+              <a:t>01.09.2024</a:t>
             </a:fld>
             <a:endParaRPr lang="ro-RO"/>
           </a:p>
@@ -2696,7 +2710,7 @@
           <a:p>
             <a:fld id="{4A65FBF5-449C-444B-A30D-7871BA1ECC0D}" type="datetimeFigureOut">
               <a:rPr lang="ro-RO" smtClean="0"/>
-              <a:t>29.08.2024</a:t>
+              <a:t>01.09.2024</a:t>
             </a:fld>
             <a:endParaRPr lang="ro-RO"/>
           </a:p>
@@ -2939,7 +2953,7 @@
           <a:p>
             <a:fld id="{4A65FBF5-449C-444B-A30D-7871BA1ECC0D}" type="datetimeFigureOut">
               <a:rPr lang="ro-RO" smtClean="0"/>
-              <a:t>29.08.2024</a:t>
+              <a:t>01.09.2024</a:t>
             </a:fld>
             <a:endParaRPr lang="ro-RO"/>
           </a:p>
@@ -3459,6 +3473,1856 @@
           <p:cNvPr id="2" name="Title 1">
             <a:extLst>
               <a:ext uri="{FF2B5EF4-FFF2-40B4-BE49-F238E27FC236}">
+                <a16:creationId xmlns:a16="http://schemas.microsoft.com/office/drawing/2014/main" id="{EF5FD5CF-C8DD-252A-2FA5-02978D23B94F}"/>
+              </a:ext>
+            </a:extLst>
+          </p:cNvPr>
+          <p:cNvSpPr>
+            <a:spLocks noGrp="1"/>
+          </p:cNvSpPr>
+          <p:nvPr>
+            <p:ph type="title"/>
+          </p:nvPr>
+        </p:nvSpPr>
+        <p:spPr/>
+        <p:txBody>
+          <a:bodyPr/>
+          <a:lstStyle/>
+          <a:p>
+            <a:r>
+              <a:rPr lang="en-US" dirty="0" err="1"/>
+              <a:t>Implementarea</a:t>
+            </a:r>
+            <a:r>
+              <a:rPr lang="en-US" dirty="0"/>
+              <a:t> </a:t>
+            </a:r>
+            <a:r>
+              <a:rPr lang="en-US" dirty="0" err="1"/>
+              <a:t>solutiei</a:t>
+            </a:r>
+            <a:endParaRPr lang="ro-RO" dirty="0"/>
+          </a:p>
+        </p:txBody>
+      </p:sp>
+      <p:sp>
+        <p:nvSpPr>
+          <p:cNvPr id="3" name="Content Placeholder 2">
+            <a:extLst>
+              <a:ext uri="{FF2B5EF4-FFF2-40B4-BE49-F238E27FC236}">
+                <a16:creationId xmlns:a16="http://schemas.microsoft.com/office/drawing/2014/main" id="{9131BEB1-C4A9-E428-C049-360B7CE0A617}"/>
+              </a:ext>
+            </a:extLst>
+          </p:cNvPr>
+          <p:cNvSpPr>
+            <a:spLocks noGrp="1"/>
+          </p:cNvSpPr>
+          <p:nvPr>
+            <p:ph idx="1"/>
+          </p:nvPr>
+        </p:nvSpPr>
+        <p:spPr/>
+        <p:txBody>
+          <a:bodyPr/>
+          <a:lstStyle/>
+          <a:p>
+            <a:r>
+              <a:rPr lang="en-US" dirty="0" err="1"/>
+              <a:t>Modulul</a:t>
+            </a:r>
+            <a:r>
+              <a:rPr lang="en-US" dirty="0"/>
+              <a:t> </a:t>
+            </a:r>
+            <a:r>
+              <a:rPr lang="en-US" dirty="0" err="1"/>
+              <a:t>senzor</a:t>
+            </a:r>
+            <a:r>
+              <a:rPr lang="en-US" dirty="0"/>
+              <a:t>:</a:t>
+            </a:r>
+          </a:p>
+          <a:p>
+            <a:pPr lvl="1"/>
+            <a:r>
+              <a:rPr lang="en-US" dirty="0" err="1"/>
+              <a:t>Placa</a:t>
+            </a:r>
+            <a:r>
+              <a:rPr lang="en-US" dirty="0"/>
+              <a:t> de </a:t>
+            </a:r>
+            <a:r>
+              <a:rPr lang="en-US" dirty="0" err="1"/>
+              <a:t>dezvoltare</a:t>
+            </a:r>
+            <a:r>
+              <a:rPr lang="en-US" dirty="0"/>
+              <a:t> ArtyZ7</a:t>
+            </a:r>
+          </a:p>
+          <a:p>
+            <a:pPr lvl="1"/>
+            <a:r>
+              <a:rPr lang="en-US" dirty="0" err="1"/>
+              <a:t>Senzori</a:t>
+            </a:r>
+            <a:r>
+              <a:rPr lang="en-US" dirty="0"/>
+              <a:t> </a:t>
+            </a:r>
+            <a:r>
+              <a:rPr lang="en-US" dirty="0" err="1"/>
+              <a:t>pentru</a:t>
+            </a:r>
+            <a:r>
+              <a:rPr lang="en-US" dirty="0"/>
+              <a:t> </a:t>
+            </a:r>
+            <a:r>
+              <a:rPr lang="en-US" dirty="0" err="1"/>
+              <a:t>esantionarea</a:t>
+            </a:r>
+            <a:r>
+              <a:rPr lang="en-US" dirty="0"/>
+              <a:t> </a:t>
+            </a:r>
+            <a:r>
+              <a:rPr lang="en-US" dirty="0" err="1"/>
+              <a:t>parametrilor</a:t>
+            </a:r>
+            <a:r>
+              <a:rPr lang="en-US" dirty="0"/>
+              <a:t> de </a:t>
+            </a:r>
+            <a:r>
+              <a:rPr lang="en-US" dirty="0" err="1"/>
+              <a:t>calitate</a:t>
+            </a:r>
+            <a:r>
+              <a:rPr lang="en-US" dirty="0"/>
+              <a:t> a </a:t>
+            </a:r>
+            <a:r>
+              <a:rPr lang="en-US" dirty="0" err="1"/>
+              <a:t>aerului</a:t>
+            </a:r>
+            <a:r>
+              <a:rPr lang="en-US" dirty="0"/>
+              <a:t>:</a:t>
+            </a:r>
+          </a:p>
+          <a:p>
+            <a:pPr lvl="2"/>
+            <a:r>
+              <a:rPr lang="en-US" dirty="0" err="1"/>
+              <a:t>Texax</a:t>
+            </a:r>
+            <a:r>
+              <a:rPr lang="en-US" dirty="0"/>
+              <a:t> Instruments HDC1080 </a:t>
+            </a:r>
+            <a:r>
+              <a:rPr lang="en-US" dirty="0" err="1"/>
+              <a:t>pentru</a:t>
+            </a:r>
+            <a:r>
+              <a:rPr lang="en-US" dirty="0"/>
+              <a:t> </a:t>
+            </a:r>
+            <a:r>
+              <a:rPr lang="en-US" dirty="0" err="1"/>
+              <a:t>temperatura</a:t>
+            </a:r>
+            <a:r>
+              <a:rPr lang="en-US" dirty="0"/>
+              <a:t> </a:t>
+            </a:r>
+            <a:r>
+              <a:rPr lang="en-US" dirty="0" err="1"/>
+              <a:t>si</a:t>
+            </a:r>
+            <a:r>
+              <a:rPr lang="en-US" dirty="0"/>
+              <a:t> </a:t>
+            </a:r>
+            <a:r>
+              <a:rPr lang="en-US" dirty="0" err="1"/>
+              <a:t>umiditate</a:t>
+            </a:r>
+            <a:endParaRPr lang="en-US" dirty="0"/>
+          </a:p>
+          <a:p>
+            <a:pPr lvl="2"/>
+            <a:r>
+              <a:rPr lang="en-US" dirty="0" err="1"/>
+              <a:t>Sensirion</a:t>
+            </a:r>
+            <a:r>
+              <a:rPr lang="en-US" dirty="0"/>
+              <a:t> SPS30 </a:t>
+            </a:r>
+            <a:r>
+              <a:rPr lang="en-US" dirty="0" err="1"/>
+              <a:t>pentru</a:t>
+            </a:r>
+            <a:r>
+              <a:rPr lang="en-US" dirty="0"/>
+              <a:t> </a:t>
+            </a:r>
+            <a:r>
+              <a:rPr lang="en-US" dirty="0" err="1"/>
+              <a:t>particulele</a:t>
+            </a:r>
+            <a:r>
+              <a:rPr lang="en-US" dirty="0"/>
+              <a:t> in </a:t>
+            </a:r>
+            <a:r>
+              <a:rPr lang="en-US" dirty="0" err="1"/>
+              <a:t>suspensie</a:t>
+            </a:r>
+            <a:endParaRPr lang="en-US" dirty="0"/>
+          </a:p>
+          <a:p>
+            <a:pPr lvl="2"/>
+            <a:r>
+              <a:rPr lang="en-US" dirty="0" err="1"/>
+              <a:t>Sensirion</a:t>
+            </a:r>
+            <a:r>
+              <a:rPr lang="en-US" dirty="0"/>
+              <a:t> SGP40 </a:t>
+            </a:r>
+            <a:r>
+              <a:rPr lang="en-US" dirty="0" err="1"/>
+              <a:t>pentru</a:t>
+            </a:r>
+            <a:r>
+              <a:rPr lang="en-US" dirty="0"/>
+              <a:t> </a:t>
+            </a:r>
+            <a:r>
+              <a:rPr lang="en-US" dirty="0" err="1"/>
+              <a:t>compusii</a:t>
+            </a:r>
+            <a:r>
+              <a:rPr lang="en-US" dirty="0"/>
+              <a:t> </a:t>
+            </a:r>
+            <a:r>
+              <a:rPr lang="en-US" dirty="0" err="1"/>
+              <a:t>organici</a:t>
+            </a:r>
+            <a:r>
+              <a:rPr lang="en-US" dirty="0"/>
+              <a:t> volatile</a:t>
+            </a:r>
+          </a:p>
+          <a:p>
+            <a:pPr lvl="1"/>
+            <a:r>
+              <a:rPr lang="en-US" dirty="0"/>
+              <a:t>Controller de </a:t>
+            </a:r>
+            <a:r>
+              <a:rPr lang="en-US" dirty="0" err="1"/>
+              <a:t>retea</a:t>
+            </a:r>
+            <a:r>
+              <a:rPr lang="en-US" dirty="0"/>
+              <a:t> ATWINC1500</a:t>
+            </a:r>
+          </a:p>
+          <a:p>
+            <a:pPr lvl="1"/>
+            <a:r>
+              <a:rPr lang="en-US" dirty="0" err="1"/>
+              <a:t>Esantionare</a:t>
+            </a:r>
+            <a:r>
+              <a:rPr lang="en-US" dirty="0"/>
+              <a:t> </a:t>
+            </a:r>
+            <a:r>
+              <a:rPr lang="en-US" dirty="0" err="1"/>
+              <a:t>parametrii</a:t>
+            </a:r>
+            <a:r>
+              <a:rPr lang="en-US" dirty="0"/>
+              <a:t> periodic</a:t>
+            </a:r>
+          </a:p>
+          <a:p>
+            <a:pPr lvl="1"/>
+            <a:r>
+              <a:rPr lang="en-US" dirty="0" err="1"/>
+              <a:t>Transmiterea</a:t>
+            </a:r>
+            <a:r>
+              <a:rPr lang="en-US" dirty="0"/>
+              <a:t> </a:t>
+            </a:r>
+            <a:r>
+              <a:rPr lang="en-US" dirty="0" err="1"/>
+              <a:t>parametrilor</a:t>
+            </a:r>
+            <a:r>
+              <a:rPr lang="en-US" dirty="0"/>
+              <a:t> </a:t>
+            </a:r>
+            <a:r>
+              <a:rPr lang="en-US" dirty="0" err="1"/>
+              <a:t>catre</a:t>
+            </a:r>
+            <a:r>
+              <a:rPr lang="en-US" dirty="0"/>
+              <a:t> </a:t>
+            </a:r>
+            <a:r>
+              <a:rPr lang="en-US" dirty="0" err="1"/>
+              <a:t>Brokerul</a:t>
+            </a:r>
+            <a:r>
+              <a:rPr lang="en-US" dirty="0"/>
+              <a:t> MQTT</a:t>
+            </a:r>
+          </a:p>
+        </p:txBody>
+      </p:sp>
+    </p:spTree>
+    <p:extLst>
+      <p:ext uri="{BB962C8B-B14F-4D97-AF65-F5344CB8AC3E}">
+        <p14:creationId xmlns:p14="http://schemas.microsoft.com/office/powerpoint/2010/main" val="1392760137"/>
+      </p:ext>
+    </p:extLst>
+  </p:cSld>
+  <p:clrMapOvr>
+    <a:masterClrMapping/>
+  </p:clrMapOvr>
+</p:sld>
+</file>
+
+<file path=ppt/slides/slide11.xml><?xml version="1.0" encoding="utf-8"?>
+<p:sld xmlns:a="http://schemas.openxmlformats.org/drawingml/2006/main" xmlns:r="http://schemas.openxmlformats.org/officeDocument/2006/relationships" xmlns:p="http://schemas.openxmlformats.org/presentationml/2006/main">
+  <p:cSld>
+    <p:spTree>
+      <p:nvGrpSpPr>
+        <p:cNvPr id="1" name=""/>
+        <p:cNvGrpSpPr/>
+        <p:nvPr/>
+      </p:nvGrpSpPr>
+      <p:grpSpPr>
+        <a:xfrm>
+          <a:off x="0" y="0"/>
+          <a:ext cx="0" cy="0"/>
+          <a:chOff x="0" y="0"/>
+          <a:chExt cx="0" cy="0"/>
+        </a:xfrm>
+      </p:grpSpPr>
+      <p:sp>
+        <p:nvSpPr>
+          <p:cNvPr id="2" name="Title 1">
+            <a:extLst>
+              <a:ext uri="{FF2B5EF4-FFF2-40B4-BE49-F238E27FC236}">
+                <a16:creationId xmlns:a16="http://schemas.microsoft.com/office/drawing/2014/main" id="{DA56D199-E91A-1500-85D1-3223B145E43B}"/>
+              </a:ext>
+            </a:extLst>
+          </p:cNvPr>
+          <p:cNvSpPr>
+            <a:spLocks noGrp="1"/>
+          </p:cNvSpPr>
+          <p:nvPr>
+            <p:ph type="title"/>
+          </p:nvPr>
+        </p:nvSpPr>
+        <p:spPr/>
+        <p:txBody>
+          <a:bodyPr/>
+          <a:lstStyle/>
+          <a:p>
+            <a:r>
+              <a:rPr lang="en-US"/>
+              <a:t>Implementarea solutiei</a:t>
+            </a:r>
+            <a:endParaRPr lang="ro-RO" dirty="0"/>
+          </a:p>
+        </p:txBody>
+      </p:sp>
+      <p:pic>
+        <p:nvPicPr>
+          <p:cNvPr id="5" name="Content Placeholder 4" descr="A close-up of a logo&#10;&#10;Description automatically generated">
+            <a:extLst>
+              <a:ext uri="{FF2B5EF4-FFF2-40B4-BE49-F238E27FC236}">
+                <a16:creationId xmlns:a16="http://schemas.microsoft.com/office/drawing/2014/main" id="{DBD25F04-EDD2-5734-2822-117FA99EC1BA}"/>
+              </a:ext>
+            </a:extLst>
+          </p:cNvPr>
+          <p:cNvPicPr>
+            <a:picLocks noGrp="1" noChangeAspect="1"/>
+          </p:cNvPicPr>
+          <p:nvPr>
+            <p:ph idx="1"/>
+          </p:nvPr>
+        </p:nvPicPr>
+        <p:blipFill>
+          <a:blip r:embed="rId2">
+            <a:extLst>
+              <a:ext uri="{28A0092B-C50C-407E-A947-70E740481C1C}">
+                <a14:useLocalDpi xmlns:a14="http://schemas.microsoft.com/office/drawing/2010/main" val="0"/>
+              </a:ext>
+            </a:extLst>
+          </a:blip>
+          <a:stretch>
+            <a:fillRect/>
+          </a:stretch>
+        </p:blipFill>
+        <p:spPr>
+          <a:xfrm>
+            <a:off x="1739224" y="2508557"/>
+            <a:ext cx="8713552" cy="2739411"/>
+          </a:xfrm>
+        </p:spPr>
+      </p:pic>
+    </p:spTree>
+    <p:extLst>
+      <p:ext uri="{BB962C8B-B14F-4D97-AF65-F5344CB8AC3E}">
+        <p14:creationId xmlns:p14="http://schemas.microsoft.com/office/powerpoint/2010/main" val="969906032"/>
+      </p:ext>
+    </p:extLst>
+  </p:cSld>
+  <p:clrMapOvr>
+    <a:masterClrMapping/>
+  </p:clrMapOvr>
+</p:sld>
+</file>
+
+<file path=ppt/slides/slide12.xml><?xml version="1.0" encoding="utf-8"?>
+<p:sld xmlns:a="http://schemas.openxmlformats.org/drawingml/2006/main" xmlns:r="http://schemas.openxmlformats.org/officeDocument/2006/relationships" xmlns:p="http://schemas.openxmlformats.org/presentationml/2006/main">
+  <p:cSld>
+    <p:spTree>
+      <p:nvGrpSpPr>
+        <p:cNvPr id="1" name=""/>
+        <p:cNvGrpSpPr/>
+        <p:nvPr/>
+      </p:nvGrpSpPr>
+      <p:grpSpPr>
+        <a:xfrm>
+          <a:off x="0" y="0"/>
+          <a:ext cx="0" cy="0"/>
+          <a:chOff x="0" y="0"/>
+          <a:chExt cx="0" cy="0"/>
+        </a:xfrm>
+      </p:grpSpPr>
+      <p:sp>
+        <p:nvSpPr>
+          <p:cNvPr id="2" name="Title 1">
+            <a:extLst>
+              <a:ext uri="{FF2B5EF4-FFF2-40B4-BE49-F238E27FC236}">
+                <a16:creationId xmlns:a16="http://schemas.microsoft.com/office/drawing/2014/main" id="{41DA6E5A-9153-73D0-6A6B-3092694D2F5D}"/>
+              </a:ext>
+            </a:extLst>
+          </p:cNvPr>
+          <p:cNvSpPr>
+            <a:spLocks noGrp="1"/>
+          </p:cNvSpPr>
+          <p:nvPr>
+            <p:ph type="title"/>
+          </p:nvPr>
+        </p:nvSpPr>
+        <p:spPr/>
+        <p:txBody>
+          <a:bodyPr/>
+          <a:lstStyle/>
+          <a:p>
+            <a:r>
+              <a:rPr lang="en-US" dirty="0" err="1"/>
+              <a:t>Implementarea</a:t>
+            </a:r>
+            <a:r>
+              <a:rPr lang="en-US" dirty="0"/>
+              <a:t> </a:t>
+            </a:r>
+            <a:r>
+              <a:rPr lang="en-US" dirty="0" err="1"/>
+              <a:t>Solutiei</a:t>
+            </a:r>
+            <a:endParaRPr lang="ro-RO" dirty="0"/>
+          </a:p>
+        </p:txBody>
+      </p:sp>
+      <p:sp>
+        <p:nvSpPr>
+          <p:cNvPr id="6" name="Content Placeholder 5">
+            <a:extLst>
+              <a:ext uri="{FF2B5EF4-FFF2-40B4-BE49-F238E27FC236}">
+                <a16:creationId xmlns:a16="http://schemas.microsoft.com/office/drawing/2014/main" id="{DDB871CE-2F4C-2990-379A-F8B1A464D6C5}"/>
+              </a:ext>
+            </a:extLst>
+          </p:cNvPr>
+          <p:cNvSpPr>
+            <a:spLocks noGrp="1"/>
+          </p:cNvSpPr>
+          <p:nvPr>
+            <p:ph sz="half" idx="1"/>
+          </p:nvPr>
+        </p:nvSpPr>
+        <p:spPr/>
+        <p:txBody>
+          <a:bodyPr>
+            <a:normAutofit fontScale="92500"/>
+          </a:bodyPr>
+          <a:lstStyle/>
+          <a:p>
+            <a:r>
+              <a:rPr lang="en-US" dirty="0"/>
+              <a:t>Broker MQTT:</a:t>
+            </a:r>
+          </a:p>
+          <a:p>
+            <a:pPr lvl="1"/>
+            <a:r>
+              <a:rPr lang="en-US" dirty="0"/>
+              <a:t>Am </a:t>
+            </a:r>
+            <a:r>
+              <a:rPr lang="en-US" dirty="0" err="1"/>
+              <a:t>utilizat</a:t>
+            </a:r>
+            <a:r>
+              <a:rPr lang="en-US" dirty="0"/>
+              <a:t> </a:t>
+            </a:r>
+            <a:r>
+              <a:rPr lang="en-US" dirty="0" err="1"/>
+              <a:t>Brokerul</a:t>
+            </a:r>
+            <a:r>
+              <a:rPr lang="en-US" dirty="0"/>
+              <a:t> MQTT </a:t>
+            </a:r>
+            <a:r>
+              <a:rPr lang="en-US" dirty="0" err="1"/>
+              <a:t>Mosquitto</a:t>
+            </a:r>
+            <a:endParaRPr lang="en-US" dirty="0"/>
+          </a:p>
+          <a:p>
+            <a:pPr lvl="1"/>
+            <a:r>
+              <a:rPr lang="en-US" dirty="0" err="1"/>
+              <a:t>Exemplu</a:t>
+            </a:r>
+            <a:r>
+              <a:rPr lang="en-US" dirty="0"/>
+              <a:t> topic: “readings/F8F005ADB2A9/airQ1”</a:t>
+            </a:r>
+          </a:p>
+          <a:p>
+            <a:pPr lvl="1"/>
+            <a:r>
+              <a:rPr lang="en-US" dirty="0"/>
+              <a:t>Subscriber wildcard </a:t>
+            </a:r>
+            <a:r>
+              <a:rPr lang="en-US" dirty="0" err="1"/>
+              <a:t>pentru</a:t>
+            </a:r>
+            <a:r>
+              <a:rPr lang="en-US" dirty="0"/>
+              <a:t> </a:t>
+            </a:r>
+            <a:r>
+              <a:rPr lang="en-US" dirty="0" err="1"/>
+              <a:t>interceptarea</a:t>
+            </a:r>
+            <a:r>
+              <a:rPr lang="en-US" dirty="0"/>
+              <a:t> </a:t>
+            </a:r>
+            <a:r>
+              <a:rPr lang="en-US" dirty="0" err="1"/>
+              <a:t>mesajelor</a:t>
+            </a:r>
+            <a:r>
+              <a:rPr lang="en-US" dirty="0"/>
+              <a:t> de la </a:t>
+            </a:r>
+            <a:r>
+              <a:rPr lang="en-US" dirty="0" err="1"/>
+              <a:t>senzori</a:t>
+            </a:r>
+            <a:endParaRPr lang="en-US" dirty="0"/>
+          </a:p>
+          <a:p>
+            <a:pPr lvl="2"/>
+            <a:r>
+              <a:rPr lang="en-US" dirty="0"/>
+              <a:t>“readings/#”</a:t>
+            </a:r>
+          </a:p>
+          <a:p>
+            <a:pPr lvl="1"/>
+            <a:r>
+              <a:rPr lang="en-US" dirty="0" err="1"/>
+              <a:t>Transmiterea</a:t>
+            </a:r>
+            <a:r>
+              <a:rPr lang="en-US" dirty="0"/>
+              <a:t> </a:t>
+            </a:r>
+            <a:r>
+              <a:rPr lang="en-US" dirty="0" err="1"/>
+              <a:t>mesajelor</a:t>
+            </a:r>
+            <a:r>
+              <a:rPr lang="en-US" dirty="0"/>
+              <a:t> </a:t>
+            </a:r>
+            <a:r>
+              <a:rPr lang="en-US" dirty="0" err="1"/>
+              <a:t>interceptate</a:t>
+            </a:r>
+            <a:r>
+              <a:rPr lang="en-US" dirty="0"/>
+              <a:t> </a:t>
+            </a:r>
+            <a:r>
+              <a:rPr lang="en-US" dirty="0" err="1"/>
+              <a:t>catre</a:t>
+            </a:r>
+            <a:r>
+              <a:rPr lang="en-US" dirty="0"/>
+              <a:t> </a:t>
+            </a:r>
+            <a:r>
+              <a:rPr lang="en-US" dirty="0" err="1"/>
+              <a:t>serverul</a:t>
+            </a:r>
+            <a:r>
+              <a:rPr lang="en-US" dirty="0"/>
+              <a:t> RESTful</a:t>
+            </a:r>
+          </a:p>
+          <a:p>
+            <a:pPr lvl="1"/>
+            <a:r>
+              <a:rPr lang="en-US" dirty="0" err="1"/>
+              <a:t>Salvarea</a:t>
+            </a:r>
+            <a:r>
+              <a:rPr lang="en-US" dirty="0"/>
+              <a:t> </a:t>
+            </a:r>
+            <a:r>
+              <a:rPr lang="en-US" dirty="0" err="1"/>
+              <a:t>mesajelor</a:t>
+            </a:r>
+            <a:r>
+              <a:rPr lang="en-US" dirty="0"/>
+              <a:t> in </a:t>
+            </a:r>
+            <a:r>
+              <a:rPr lang="en-US" dirty="0" err="1"/>
+              <a:t>baza</a:t>
+            </a:r>
+            <a:r>
+              <a:rPr lang="en-US" dirty="0"/>
+              <a:t> de date</a:t>
+            </a:r>
+          </a:p>
+          <a:p>
+            <a:endParaRPr lang="ro-RO" dirty="0"/>
+          </a:p>
+        </p:txBody>
+      </p:sp>
+      <p:pic>
+        <p:nvPicPr>
+          <p:cNvPr id="8" name="Content Placeholder 7" descr="A screenshot of a computer&#10;&#10;Description automatically generated">
+            <a:extLst>
+              <a:ext uri="{FF2B5EF4-FFF2-40B4-BE49-F238E27FC236}">
+                <a16:creationId xmlns:a16="http://schemas.microsoft.com/office/drawing/2014/main" id="{50F64062-6192-5799-0871-C04F530B6E71}"/>
+              </a:ext>
+            </a:extLst>
+          </p:cNvPr>
+          <p:cNvPicPr>
+            <a:picLocks noGrp="1" noChangeAspect="1"/>
+          </p:cNvPicPr>
+          <p:nvPr>
+            <p:ph sz="half" idx="2"/>
+          </p:nvPr>
+        </p:nvPicPr>
+        <p:blipFill>
+          <a:blip r:embed="rId2">
+            <a:extLst>
+              <a:ext uri="{28A0092B-C50C-407E-A947-70E740481C1C}">
+                <a14:useLocalDpi xmlns:a14="http://schemas.microsoft.com/office/drawing/2010/main" val="0"/>
+              </a:ext>
+            </a:extLst>
+          </a:blip>
+          <a:stretch>
+            <a:fillRect/>
+          </a:stretch>
+        </p:blipFill>
+        <p:spPr>
+          <a:xfrm>
+            <a:off x="6788959" y="1933284"/>
+            <a:ext cx="4776327" cy="3758023"/>
+          </a:xfrm>
+        </p:spPr>
+      </p:pic>
+    </p:spTree>
+    <p:extLst>
+      <p:ext uri="{BB962C8B-B14F-4D97-AF65-F5344CB8AC3E}">
+        <p14:creationId xmlns:p14="http://schemas.microsoft.com/office/powerpoint/2010/main" val="3003432893"/>
+      </p:ext>
+    </p:extLst>
+  </p:cSld>
+  <p:clrMapOvr>
+    <a:masterClrMapping/>
+  </p:clrMapOvr>
+</p:sld>
+</file>
+
+<file path=ppt/slides/slide13.xml><?xml version="1.0" encoding="utf-8"?>
+<p:sld xmlns:a="http://schemas.openxmlformats.org/drawingml/2006/main" xmlns:r="http://schemas.openxmlformats.org/officeDocument/2006/relationships" xmlns:p="http://schemas.openxmlformats.org/presentationml/2006/main">
+  <p:cSld>
+    <p:spTree>
+      <p:nvGrpSpPr>
+        <p:cNvPr id="1" name=""/>
+        <p:cNvGrpSpPr/>
+        <p:nvPr/>
+      </p:nvGrpSpPr>
+      <p:grpSpPr>
+        <a:xfrm>
+          <a:off x="0" y="0"/>
+          <a:ext cx="0" cy="0"/>
+          <a:chOff x="0" y="0"/>
+          <a:chExt cx="0" cy="0"/>
+        </a:xfrm>
+      </p:grpSpPr>
+      <p:sp>
+        <p:nvSpPr>
+          <p:cNvPr id="2" name="Title 1">
+            <a:extLst>
+              <a:ext uri="{FF2B5EF4-FFF2-40B4-BE49-F238E27FC236}">
+                <a16:creationId xmlns:a16="http://schemas.microsoft.com/office/drawing/2014/main" id="{73C59D39-0A71-4C18-6799-FCA28A3DD10A}"/>
+              </a:ext>
+            </a:extLst>
+          </p:cNvPr>
+          <p:cNvSpPr>
+            <a:spLocks noGrp="1"/>
+          </p:cNvSpPr>
+          <p:nvPr>
+            <p:ph type="title"/>
+          </p:nvPr>
+        </p:nvSpPr>
+        <p:spPr/>
+        <p:txBody>
+          <a:bodyPr/>
+          <a:lstStyle/>
+          <a:p>
+            <a:r>
+              <a:rPr lang="en-US" dirty="0" err="1"/>
+              <a:t>Implementarea</a:t>
+            </a:r>
+            <a:r>
+              <a:rPr lang="en-US" dirty="0"/>
+              <a:t> </a:t>
+            </a:r>
+            <a:r>
+              <a:rPr lang="en-US" dirty="0" err="1"/>
+              <a:t>solutiei</a:t>
+            </a:r>
+            <a:endParaRPr lang="ro-RO" dirty="0"/>
+          </a:p>
+        </p:txBody>
+      </p:sp>
+      <p:sp>
+        <p:nvSpPr>
+          <p:cNvPr id="3" name="Content Placeholder 2">
+            <a:extLst>
+              <a:ext uri="{FF2B5EF4-FFF2-40B4-BE49-F238E27FC236}">
+                <a16:creationId xmlns:a16="http://schemas.microsoft.com/office/drawing/2014/main" id="{E1C942B6-9457-854D-5D46-F5EE1D9A3D22}"/>
+              </a:ext>
+            </a:extLst>
+          </p:cNvPr>
+          <p:cNvSpPr>
+            <a:spLocks noGrp="1"/>
+          </p:cNvSpPr>
+          <p:nvPr>
+            <p:ph sz="half" idx="1"/>
+          </p:nvPr>
+        </p:nvSpPr>
+        <p:spPr/>
+        <p:txBody>
+          <a:bodyPr/>
+          <a:lstStyle/>
+          <a:p>
+            <a:r>
+              <a:rPr lang="en-US" dirty="0" err="1"/>
+              <a:t>Baza</a:t>
+            </a:r>
+            <a:r>
+              <a:rPr lang="en-US" dirty="0"/>
+              <a:t> de date:</a:t>
+            </a:r>
+          </a:p>
+          <a:p>
+            <a:pPr lvl="1"/>
+            <a:r>
+              <a:rPr lang="en-US" dirty="0"/>
+              <a:t>Am </a:t>
+            </a:r>
+            <a:r>
+              <a:rPr lang="en-US" dirty="0" err="1"/>
+              <a:t>utilizat</a:t>
+            </a:r>
+            <a:r>
+              <a:rPr lang="en-US" dirty="0"/>
+              <a:t> </a:t>
+            </a:r>
+            <a:r>
+              <a:rPr lang="en-US" dirty="0" err="1"/>
+              <a:t>baza</a:t>
+            </a:r>
+            <a:r>
+              <a:rPr lang="en-US" dirty="0"/>
+              <a:t> de date MongoDB</a:t>
+            </a:r>
+          </a:p>
+          <a:p>
+            <a:pPr lvl="1"/>
+            <a:r>
+              <a:rPr lang="en-US" dirty="0" err="1"/>
+              <a:t>Colectii</a:t>
+            </a:r>
+            <a:r>
+              <a:rPr lang="en-US" dirty="0"/>
+              <a:t> de tip </a:t>
+            </a:r>
+            <a:r>
+              <a:rPr lang="en-US" dirty="0" err="1"/>
+              <a:t>serii</a:t>
+            </a:r>
+            <a:r>
+              <a:rPr lang="en-US" dirty="0"/>
+              <a:t> in </a:t>
+            </a:r>
+            <a:r>
+              <a:rPr lang="en-US" dirty="0" err="1"/>
+              <a:t>timp</a:t>
+            </a:r>
+            <a:endParaRPr lang="en-US" dirty="0"/>
+          </a:p>
+          <a:p>
+            <a:pPr lvl="1"/>
+            <a:r>
+              <a:rPr lang="en-US" dirty="0" err="1"/>
+              <a:t>Datele</a:t>
+            </a:r>
+            <a:r>
+              <a:rPr lang="en-US" dirty="0"/>
+              <a:t> sunt </a:t>
+            </a:r>
+            <a:r>
+              <a:rPr lang="en-US" dirty="0" err="1"/>
+              <a:t>salvate</a:t>
+            </a:r>
+            <a:r>
+              <a:rPr lang="en-US" dirty="0"/>
+              <a:t> in </a:t>
+            </a:r>
+            <a:r>
+              <a:rPr lang="en-US" dirty="0" err="1"/>
+              <a:t>documente</a:t>
+            </a:r>
+            <a:endParaRPr lang="en-US" dirty="0"/>
+          </a:p>
+          <a:p>
+            <a:pPr lvl="1"/>
+            <a:r>
+              <a:rPr lang="en-US" dirty="0"/>
+              <a:t>O </a:t>
+            </a:r>
+            <a:r>
+              <a:rPr lang="en-US" dirty="0" err="1"/>
+              <a:t>colectie</a:t>
+            </a:r>
+            <a:r>
+              <a:rPr lang="en-US" dirty="0"/>
+              <a:t> </a:t>
+            </a:r>
+            <a:r>
+              <a:rPr lang="en-US" dirty="0" err="1"/>
+              <a:t>este</a:t>
+            </a:r>
+            <a:r>
+              <a:rPr lang="en-US" dirty="0"/>
+              <a:t> </a:t>
+            </a:r>
+            <a:r>
+              <a:rPr lang="en-US" dirty="0" err="1"/>
+              <a:t>formata</a:t>
+            </a:r>
+            <a:r>
+              <a:rPr lang="en-US" dirty="0"/>
+              <a:t> din </a:t>
+            </a:r>
+            <a:r>
+              <a:rPr lang="en-US" dirty="0" err="1"/>
+              <a:t>mai</a:t>
+            </a:r>
+            <a:r>
+              <a:rPr lang="en-US" dirty="0"/>
+              <a:t> </a:t>
+            </a:r>
+            <a:r>
+              <a:rPr lang="en-US" dirty="0" err="1"/>
+              <a:t>multe</a:t>
+            </a:r>
+            <a:r>
+              <a:rPr lang="en-US" dirty="0"/>
+              <a:t> </a:t>
+            </a:r>
+            <a:r>
+              <a:rPr lang="en-US" dirty="0" err="1"/>
+              <a:t>documente</a:t>
+            </a:r>
+            <a:endParaRPr lang="en-US" dirty="0"/>
+          </a:p>
+          <a:p>
+            <a:pPr lvl="1"/>
+            <a:r>
+              <a:rPr lang="en-US" dirty="0"/>
+              <a:t>MongoDB </a:t>
+            </a:r>
+            <a:r>
+              <a:rPr lang="en-US" dirty="0" err="1"/>
+              <a:t>structureaza</a:t>
+            </a:r>
+            <a:r>
+              <a:rPr lang="en-US" dirty="0"/>
+              <a:t> automat </a:t>
+            </a:r>
+            <a:r>
+              <a:rPr lang="en-US" dirty="0" err="1"/>
+              <a:t>datele</a:t>
+            </a:r>
+            <a:r>
+              <a:rPr lang="en-US" dirty="0"/>
+              <a:t> in Buckets</a:t>
+            </a:r>
+          </a:p>
+          <a:p>
+            <a:pPr lvl="1"/>
+            <a:endParaRPr lang="en-US" dirty="0"/>
+          </a:p>
+          <a:p>
+            <a:pPr lvl="1"/>
+            <a:endParaRPr lang="ro-RO" dirty="0"/>
+          </a:p>
+        </p:txBody>
+      </p:sp>
+      <p:pic>
+        <p:nvPicPr>
+          <p:cNvPr id="10" name="Content Placeholder 9" descr="A computer code with numbers and letters&#10;&#10;Description automatically generated">
+            <a:extLst>
+              <a:ext uri="{FF2B5EF4-FFF2-40B4-BE49-F238E27FC236}">
+                <a16:creationId xmlns:a16="http://schemas.microsoft.com/office/drawing/2014/main" id="{88769DD6-17EB-4FFB-1F4B-F07F3B2BB06E}"/>
+              </a:ext>
+            </a:extLst>
+          </p:cNvPr>
+          <p:cNvPicPr>
+            <a:picLocks noGrp="1" noChangeAspect="1"/>
+          </p:cNvPicPr>
+          <p:nvPr>
+            <p:ph sz="half" idx="2"/>
+          </p:nvPr>
+        </p:nvPicPr>
+        <p:blipFill>
+          <a:blip r:embed="rId2">
+            <a:extLst>
+              <a:ext uri="{28A0092B-C50C-407E-A947-70E740481C1C}">
+                <a14:useLocalDpi xmlns:a14="http://schemas.microsoft.com/office/drawing/2010/main" val="0"/>
+              </a:ext>
+            </a:extLst>
+          </a:blip>
+          <a:stretch>
+            <a:fillRect/>
+          </a:stretch>
+        </p:blipFill>
+        <p:spPr>
+          <a:xfrm>
+            <a:off x="6172202" y="2141307"/>
+            <a:ext cx="5747041" cy="2575385"/>
+          </a:xfrm>
+        </p:spPr>
+      </p:pic>
+    </p:spTree>
+    <p:extLst>
+      <p:ext uri="{BB962C8B-B14F-4D97-AF65-F5344CB8AC3E}">
+        <p14:creationId xmlns:p14="http://schemas.microsoft.com/office/powerpoint/2010/main" val="4174288337"/>
+      </p:ext>
+    </p:extLst>
+  </p:cSld>
+  <p:clrMapOvr>
+    <a:masterClrMapping/>
+  </p:clrMapOvr>
+</p:sld>
+</file>
+
+<file path=ppt/slides/slide14.xml><?xml version="1.0" encoding="utf-8"?>
+<p:sld xmlns:a="http://schemas.openxmlformats.org/drawingml/2006/main" xmlns:r="http://schemas.openxmlformats.org/officeDocument/2006/relationships" xmlns:p="http://schemas.openxmlformats.org/presentationml/2006/main">
+  <p:cSld>
+    <p:spTree>
+      <p:nvGrpSpPr>
+        <p:cNvPr id="1" name=""/>
+        <p:cNvGrpSpPr/>
+        <p:nvPr/>
+      </p:nvGrpSpPr>
+      <p:grpSpPr>
+        <a:xfrm>
+          <a:off x="0" y="0"/>
+          <a:ext cx="0" cy="0"/>
+          <a:chOff x="0" y="0"/>
+          <a:chExt cx="0" cy="0"/>
+        </a:xfrm>
+      </p:grpSpPr>
+      <p:sp>
+        <p:nvSpPr>
+          <p:cNvPr id="2" name="Title 1">
+            <a:extLst>
+              <a:ext uri="{FF2B5EF4-FFF2-40B4-BE49-F238E27FC236}">
+                <a16:creationId xmlns:a16="http://schemas.microsoft.com/office/drawing/2014/main" id="{F8E04CF9-A2F8-925A-4DBE-1A441B157024}"/>
+              </a:ext>
+            </a:extLst>
+          </p:cNvPr>
+          <p:cNvSpPr>
+            <a:spLocks noGrp="1"/>
+          </p:cNvSpPr>
+          <p:nvPr>
+            <p:ph type="title"/>
+          </p:nvPr>
+        </p:nvSpPr>
+        <p:spPr/>
+        <p:txBody>
+          <a:bodyPr/>
+          <a:lstStyle/>
+          <a:p>
+            <a:r>
+              <a:rPr lang="en-US" dirty="0" err="1"/>
+              <a:t>Implementarea</a:t>
+            </a:r>
+            <a:r>
+              <a:rPr lang="en-US" dirty="0"/>
+              <a:t> </a:t>
+            </a:r>
+            <a:r>
+              <a:rPr lang="en-US" dirty="0" err="1"/>
+              <a:t>solutiei</a:t>
+            </a:r>
+            <a:endParaRPr lang="ro-RO" dirty="0"/>
+          </a:p>
+        </p:txBody>
+      </p:sp>
+      <p:sp>
+        <p:nvSpPr>
+          <p:cNvPr id="5" name="Content Placeholder 4">
+            <a:extLst>
+              <a:ext uri="{FF2B5EF4-FFF2-40B4-BE49-F238E27FC236}">
+                <a16:creationId xmlns:a16="http://schemas.microsoft.com/office/drawing/2014/main" id="{2DF06C33-9A7C-0D2F-8AD1-3B9E6DBB7DE2}"/>
+              </a:ext>
+            </a:extLst>
+          </p:cNvPr>
+          <p:cNvSpPr>
+            <a:spLocks noGrp="1"/>
+          </p:cNvSpPr>
+          <p:nvPr>
+            <p:ph idx="1"/>
+          </p:nvPr>
+        </p:nvSpPr>
+        <p:spPr/>
+        <p:txBody>
+          <a:bodyPr/>
+          <a:lstStyle/>
+          <a:p>
+            <a:r>
+              <a:rPr lang="en-US" dirty="0" err="1"/>
+              <a:t>Serverul</a:t>
+            </a:r>
+            <a:r>
+              <a:rPr lang="en-US" dirty="0"/>
+              <a:t> RESTful:</a:t>
+            </a:r>
+          </a:p>
+          <a:p>
+            <a:pPr lvl="1"/>
+            <a:r>
+              <a:rPr lang="en-US" dirty="0"/>
+              <a:t>Am </a:t>
+            </a:r>
+            <a:r>
+              <a:rPr lang="en-US" dirty="0" err="1"/>
+              <a:t>utilizat</a:t>
+            </a:r>
+            <a:r>
+              <a:rPr lang="en-US" dirty="0"/>
+              <a:t> </a:t>
+            </a:r>
+            <a:r>
+              <a:rPr lang="en-US" dirty="0" err="1"/>
+              <a:t>biblioteca</a:t>
+            </a:r>
+            <a:r>
+              <a:rPr lang="en-US" dirty="0"/>
+              <a:t> Flask</a:t>
+            </a:r>
+          </a:p>
+          <a:p>
+            <a:pPr lvl="1"/>
+            <a:r>
+              <a:rPr lang="en-US" dirty="0" err="1"/>
+              <a:t>Definire</a:t>
+            </a:r>
+            <a:r>
+              <a:rPr lang="en-US" dirty="0"/>
+              <a:t> </a:t>
+            </a:r>
+            <a:r>
+              <a:rPr lang="en-US" dirty="0" err="1"/>
+              <a:t>rute</a:t>
+            </a:r>
+            <a:r>
+              <a:rPr lang="en-US" dirty="0"/>
+              <a:t> de </a:t>
+            </a:r>
+            <a:r>
+              <a:rPr lang="en-US" dirty="0" err="1"/>
+              <a:t>intrare</a:t>
+            </a:r>
+            <a:r>
+              <a:rPr lang="en-US" dirty="0"/>
+              <a:t> in server (</a:t>
+            </a:r>
+            <a:r>
+              <a:rPr lang="en-US" dirty="0" err="1"/>
+              <a:t>adrese</a:t>
+            </a:r>
+            <a:r>
+              <a:rPr lang="en-US" dirty="0"/>
+              <a:t> </a:t>
+            </a:r>
+            <a:r>
+              <a:rPr lang="en-US" dirty="0" err="1"/>
+              <a:t>URl</a:t>
+            </a:r>
+            <a:r>
+              <a:rPr lang="en-US" dirty="0"/>
+              <a:t>) (Rute)</a:t>
+            </a:r>
+          </a:p>
+          <a:p>
+            <a:pPr lvl="1"/>
+            <a:r>
+              <a:rPr lang="en-US" dirty="0" err="1"/>
+              <a:t>Validarea</a:t>
+            </a:r>
+            <a:r>
+              <a:rPr lang="en-US" dirty="0"/>
+              <a:t> </a:t>
+            </a:r>
+            <a:r>
+              <a:rPr lang="en-US" dirty="0" err="1"/>
+              <a:t>datelor</a:t>
+            </a:r>
+            <a:r>
+              <a:rPr lang="en-US" dirty="0"/>
+              <a:t> care intra </a:t>
+            </a:r>
+            <a:r>
+              <a:rPr lang="en-US" dirty="0" err="1"/>
+              <a:t>si</a:t>
+            </a:r>
+            <a:r>
+              <a:rPr lang="en-US" dirty="0"/>
+              <a:t> care </a:t>
+            </a:r>
+            <a:r>
+              <a:rPr lang="en-US" dirty="0" err="1"/>
+              <a:t>ies</a:t>
+            </a:r>
+            <a:r>
+              <a:rPr lang="en-US" dirty="0"/>
+              <a:t> din server (Controller)</a:t>
+            </a:r>
+          </a:p>
+          <a:p>
+            <a:pPr lvl="1"/>
+            <a:r>
+              <a:rPr lang="en-US" dirty="0" err="1"/>
+              <a:t>Definire</a:t>
+            </a:r>
+            <a:r>
+              <a:rPr lang="en-US" dirty="0"/>
+              <a:t> </a:t>
+            </a:r>
+            <a:r>
+              <a:rPr lang="en-US" dirty="0" err="1"/>
+              <a:t>resurse</a:t>
+            </a:r>
+            <a:r>
+              <a:rPr lang="en-US" dirty="0"/>
+              <a:t> </a:t>
+            </a:r>
+            <a:r>
+              <a:rPr lang="en-US" dirty="0" err="1"/>
+              <a:t>specifice</a:t>
+            </a:r>
+            <a:r>
+              <a:rPr lang="en-US" dirty="0"/>
+              <a:t> </a:t>
+            </a:r>
+            <a:r>
+              <a:rPr lang="en-US" dirty="0" err="1"/>
+              <a:t>fiecarei</a:t>
+            </a:r>
+            <a:r>
+              <a:rPr lang="en-US" dirty="0"/>
+              <a:t> </a:t>
+            </a:r>
+            <a:r>
+              <a:rPr lang="en-US" dirty="0" err="1"/>
+              <a:t>adrese</a:t>
+            </a:r>
+            <a:r>
+              <a:rPr lang="en-US" dirty="0"/>
+              <a:t> URL (Model)</a:t>
+            </a:r>
+          </a:p>
+          <a:p>
+            <a:pPr lvl="1"/>
+            <a:r>
+              <a:rPr lang="en-US" dirty="0" err="1"/>
+              <a:t>Formatare</a:t>
+            </a:r>
+            <a:r>
+              <a:rPr lang="en-US" dirty="0"/>
+              <a:t> date </a:t>
+            </a:r>
+            <a:r>
+              <a:rPr lang="en-US" dirty="0" err="1"/>
+              <a:t>raspuns</a:t>
+            </a:r>
+            <a:r>
+              <a:rPr lang="en-US" dirty="0"/>
+              <a:t> (View)</a:t>
+            </a:r>
+          </a:p>
+          <a:p>
+            <a:pPr lvl="1"/>
+            <a:r>
+              <a:rPr lang="en-US" dirty="0" err="1"/>
+              <a:t>Marcaj</a:t>
+            </a:r>
+            <a:r>
+              <a:rPr lang="en-US" dirty="0"/>
+              <a:t> temporal UTC</a:t>
+            </a:r>
+          </a:p>
+        </p:txBody>
+      </p:sp>
+    </p:spTree>
+    <p:extLst>
+      <p:ext uri="{BB962C8B-B14F-4D97-AF65-F5344CB8AC3E}">
+        <p14:creationId xmlns:p14="http://schemas.microsoft.com/office/powerpoint/2010/main" val="1230319662"/>
+      </p:ext>
+    </p:extLst>
+  </p:cSld>
+  <p:clrMapOvr>
+    <a:masterClrMapping/>
+  </p:clrMapOvr>
+</p:sld>
+</file>
+
+<file path=ppt/slides/slide15.xml><?xml version="1.0" encoding="utf-8"?>
+<p:sld xmlns:a="http://schemas.openxmlformats.org/drawingml/2006/main" xmlns:r="http://schemas.openxmlformats.org/officeDocument/2006/relationships" xmlns:p="http://schemas.openxmlformats.org/presentationml/2006/main">
+  <p:cSld>
+    <p:spTree>
+      <p:nvGrpSpPr>
+        <p:cNvPr id="1" name=""/>
+        <p:cNvGrpSpPr/>
+        <p:nvPr/>
+      </p:nvGrpSpPr>
+      <p:grpSpPr>
+        <a:xfrm>
+          <a:off x="0" y="0"/>
+          <a:ext cx="0" cy="0"/>
+          <a:chOff x="0" y="0"/>
+          <a:chExt cx="0" cy="0"/>
+        </a:xfrm>
+      </p:grpSpPr>
+      <p:sp>
+        <p:nvSpPr>
+          <p:cNvPr id="2" name="Title 1">
+            <a:extLst>
+              <a:ext uri="{FF2B5EF4-FFF2-40B4-BE49-F238E27FC236}">
+                <a16:creationId xmlns:a16="http://schemas.microsoft.com/office/drawing/2014/main" id="{C967AC14-5C71-0908-249A-16C50A7C863C}"/>
+              </a:ext>
+            </a:extLst>
+          </p:cNvPr>
+          <p:cNvSpPr>
+            <a:spLocks noGrp="1"/>
+          </p:cNvSpPr>
+          <p:nvPr>
+            <p:ph type="title"/>
+          </p:nvPr>
+        </p:nvSpPr>
+        <p:spPr/>
+        <p:txBody>
+          <a:bodyPr/>
+          <a:lstStyle/>
+          <a:p>
+            <a:r>
+              <a:rPr lang="en-US" dirty="0" err="1"/>
+              <a:t>Implementarea</a:t>
+            </a:r>
+            <a:r>
+              <a:rPr lang="en-US" dirty="0"/>
+              <a:t> </a:t>
+            </a:r>
+            <a:r>
+              <a:rPr lang="en-US" dirty="0" err="1"/>
+              <a:t>solutiei</a:t>
+            </a:r>
+            <a:endParaRPr lang="ro-RO" dirty="0"/>
+          </a:p>
+        </p:txBody>
+      </p:sp>
+      <p:sp>
+        <p:nvSpPr>
+          <p:cNvPr id="3" name="Content Placeholder 2">
+            <a:extLst>
+              <a:ext uri="{FF2B5EF4-FFF2-40B4-BE49-F238E27FC236}">
+                <a16:creationId xmlns:a16="http://schemas.microsoft.com/office/drawing/2014/main" id="{01EBC011-F90F-726D-DAF8-4A779073C429}"/>
+              </a:ext>
+            </a:extLst>
+          </p:cNvPr>
+          <p:cNvSpPr>
+            <a:spLocks noGrp="1"/>
+          </p:cNvSpPr>
+          <p:nvPr>
+            <p:ph idx="1"/>
+          </p:nvPr>
+        </p:nvSpPr>
+        <p:spPr/>
+        <p:txBody>
+          <a:bodyPr/>
+          <a:lstStyle/>
+          <a:p>
+            <a:r>
+              <a:rPr lang="en-US" dirty="0" err="1"/>
+              <a:t>Aplicatie</a:t>
+            </a:r>
+            <a:r>
+              <a:rPr lang="en-US" dirty="0"/>
+              <a:t> Android:</a:t>
+            </a:r>
+          </a:p>
+          <a:p>
+            <a:pPr lvl="1"/>
+            <a:r>
+              <a:rPr lang="en-US" dirty="0" err="1"/>
+              <a:t>Pagina</a:t>
+            </a:r>
+            <a:r>
+              <a:rPr lang="en-US" dirty="0"/>
+              <a:t> </a:t>
+            </a:r>
+            <a:r>
+              <a:rPr lang="en-US" dirty="0" err="1"/>
+              <a:t>principala</a:t>
+            </a:r>
+            <a:r>
+              <a:rPr lang="en-US" dirty="0"/>
+              <a:t> </a:t>
+            </a:r>
+            <a:r>
+              <a:rPr lang="en-US" dirty="0" err="1"/>
+              <a:t>prezinta</a:t>
+            </a:r>
+            <a:r>
+              <a:rPr lang="en-US" dirty="0"/>
+              <a:t> o </a:t>
+            </a:r>
+            <a:r>
+              <a:rPr lang="en-US" dirty="0" err="1"/>
+              <a:t>lista</a:t>
+            </a:r>
+            <a:r>
+              <a:rPr lang="en-US" dirty="0"/>
+              <a:t> a </a:t>
+            </a:r>
+            <a:r>
+              <a:rPr lang="en-US" dirty="0" err="1"/>
+              <a:t>senzorilor</a:t>
+            </a:r>
+            <a:r>
+              <a:rPr lang="en-US" dirty="0"/>
+              <a:t> </a:t>
+            </a:r>
+            <a:r>
+              <a:rPr lang="en-US" dirty="0" err="1"/>
+              <a:t>accesati</a:t>
+            </a:r>
+            <a:endParaRPr lang="en-US" dirty="0"/>
+          </a:p>
+          <a:p>
+            <a:pPr lvl="1"/>
+            <a:r>
+              <a:rPr lang="en-US" dirty="0" err="1"/>
+              <a:t>Selectarea</a:t>
+            </a:r>
+            <a:r>
+              <a:rPr lang="en-US" dirty="0"/>
+              <a:t> </a:t>
+            </a:r>
+            <a:r>
+              <a:rPr lang="en-US" dirty="0" err="1"/>
+              <a:t>unui</a:t>
+            </a:r>
+            <a:r>
+              <a:rPr lang="en-US" dirty="0"/>
+              <a:t> </a:t>
+            </a:r>
+            <a:r>
+              <a:rPr lang="en-US" dirty="0" err="1"/>
+              <a:t>senzor</a:t>
+            </a:r>
+            <a:r>
+              <a:rPr lang="en-US" dirty="0"/>
+              <a:t> </a:t>
+            </a:r>
+            <a:r>
+              <a:rPr lang="en-US" dirty="0" err="1"/>
+              <a:t>deschide</a:t>
+            </a:r>
+            <a:r>
+              <a:rPr lang="en-US" dirty="0"/>
+              <a:t> </a:t>
+            </a:r>
+            <a:r>
+              <a:rPr lang="en-US" dirty="0" err="1"/>
+              <a:t>pagina</a:t>
+            </a:r>
+            <a:r>
+              <a:rPr lang="en-US" dirty="0"/>
+              <a:t> de </a:t>
+            </a:r>
+            <a:r>
+              <a:rPr lang="en-US" dirty="0" err="1"/>
+              <a:t>vizualizare</a:t>
+            </a:r>
+            <a:r>
+              <a:rPr lang="en-US" dirty="0"/>
+              <a:t> a </a:t>
+            </a:r>
+            <a:r>
+              <a:rPr lang="en-US" dirty="0" err="1"/>
+              <a:t>parametrilor</a:t>
+            </a:r>
+            <a:endParaRPr lang="en-US" dirty="0"/>
+          </a:p>
+          <a:p>
+            <a:pPr lvl="1"/>
+            <a:r>
+              <a:rPr lang="en-US" dirty="0" err="1"/>
+              <a:t>Selectarea</a:t>
+            </a:r>
+            <a:r>
+              <a:rPr lang="en-US" dirty="0"/>
+              <a:t> </a:t>
+            </a:r>
+            <a:r>
+              <a:rPr lang="en-US" dirty="0" err="1"/>
+              <a:t>oricarui</a:t>
+            </a:r>
+            <a:r>
+              <a:rPr lang="en-US" dirty="0"/>
+              <a:t> </a:t>
+            </a:r>
+            <a:r>
+              <a:rPr lang="en-US" dirty="0" err="1"/>
+              <a:t>parametru</a:t>
+            </a:r>
+            <a:r>
+              <a:rPr lang="en-US" dirty="0"/>
+              <a:t> din </a:t>
+            </a:r>
+            <a:r>
+              <a:rPr lang="en-US" dirty="0" err="1"/>
+              <a:t>lista</a:t>
+            </a:r>
+            <a:r>
+              <a:rPr lang="en-US" dirty="0"/>
+              <a:t> </a:t>
+            </a:r>
+            <a:r>
+              <a:rPr lang="en-US" dirty="0" err="1"/>
+              <a:t>deschide</a:t>
+            </a:r>
+            <a:r>
+              <a:rPr lang="en-US" dirty="0"/>
+              <a:t> </a:t>
+            </a:r>
+            <a:r>
+              <a:rPr lang="en-US" dirty="0" err="1"/>
+              <a:t>pagina</a:t>
+            </a:r>
+            <a:r>
+              <a:rPr lang="en-US" dirty="0"/>
+              <a:t> de </a:t>
+            </a:r>
+            <a:r>
+              <a:rPr lang="en-US" dirty="0" err="1"/>
+              <a:t>grafice</a:t>
+            </a:r>
+            <a:endParaRPr lang="en-US" dirty="0"/>
+          </a:p>
+          <a:p>
+            <a:pPr lvl="1"/>
+            <a:r>
+              <a:rPr lang="en-US" dirty="0" err="1"/>
+              <a:t>Mentine</a:t>
+            </a:r>
+            <a:r>
+              <a:rPr lang="en-US" dirty="0"/>
+              <a:t> o </a:t>
+            </a:r>
+            <a:r>
+              <a:rPr lang="en-US" dirty="0" err="1"/>
+              <a:t>conexiune</a:t>
+            </a:r>
+            <a:r>
+              <a:rPr lang="en-US" dirty="0"/>
+              <a:t> MQTT cu </a:t>
+            </a:r>
+            <a:r>
+              <a:rPr lang="en-US" dirty="0" err="1"/>
+              <a:t>Brokerul</a:t>
+            </a:r>
+            <a:endParaRPr lang="en-US" dirty="0"/>
+          </a:p>
+          <a:p>
+            <a:pPr lvl="1"/>
+            <a:r>
+              <a:rPr lang="en-US" dirty="0" err="1"/>
+              <a:t>Realizeaza</a:t>
+            </a:r>
+            <a:r>
+              <a:rPr lang="en-US" dirty="0"/>
+              <a:t> </a:t>
+            </a:r>
+            <a:r>
+              <a:rPr lang="en-US" dirty="0" err="1"/>
+              <a:t>cereri</a:t>
+            </a:r>
+            <a:r>
+              <a:rPr lang="en-US" dirty="0"/>
+              <a:t> HTTP </a:t>
+            </a:r>
+            <a:r>
+              <a:rPr lang="en-US" dirty="0" err="1"/>
+              <a:t>pentru</a:t>
+            </a:r>
+            <a:r>
+              <a:rPr lang="en-US" dirty="0"/>
+              <a:t> </a:t>
+            </a:r>
+            <a:r>
+              <a:rPr lang="en-US" dirty="0" err="1"/>
+              <a:t>afisarea</a:t>
+            </a:r>
+            <a:r>
+              <a:rPr lang="en-US" dirty="0"/>
+              <a:t> </a:t>
+            </a:r>
+            <a:r>
+              <a:rPr lang="en-US" dirty="0" err="1"/>
+              <a:t>graficelor</a:t>
+            </a:r>
+            <a:endParaRPr lang="en-US" dirty="0"/>
+          </a:p>
+          <a:p>
+            <a:pPr lvl="1"/>
+            <a:r>
+              <a:rPr lang="en-US" dirty="0" err="1"/>
+              <a:t>Datele</a:t>
+            </a:r>
+            <a:r>
+              <a:rPr lang="en-US" dirty="0"/>
+              <a:t> </a:t>
+            </a:r>
+            <a:r>
+              <a:rPr lang="en-US" dirty="0" err="1"/>
+              <a:t>senzorilor</a:t>
+            </a:r>
+            <a:r>
+              <a:rPr lang="en-US" dirty="0"/>
+              <a:t> </a:t>
+            </a:r>
+            <a:r>
+              <a:rPr lang="en-US" dirty="0" err="1"/>
+              <a:t>instalati</a:t>
+            </a:r>
+            <a:r>
+              <a:rPr lang="en-US" dirty="0"/>
+              <a:t> sunt </a:t>
+            </a:r>
+            <a:r>
+              <a:rPr lang="en-US" dirty="0" err="1"/>
+              <a:t>salvate</a:t>
+            </a:r>
+            <a:r>
+              <a:rPr lang="en-US" dirty="0"/>
+              <a:t> in </a:t>
+            </a:r>
+            <a:r>
+              <a:rPr lang="en-US" dirty="0" err="1"/>
+              <a:t>memoria</a:t>
+            </a:r>
+            <a:r>
+              <a:rPr lang="en-US" dirty="0"/>
+              <a:t> </a:t>
+            </a:r>
+            <a:r>
+              <a:rPr lang="en-US" dirty="0" err="1"/>
+              <a:t>telefonului</a:t>
+            </a:r>
+            <a:endParaRPr lang="en-US" dirty="0"/>
+          </a:p>
+          <a:p>
+            <a:pPr lvl="1"/>
+            <a:endParaRPr lang="ro-RO" dirty="0"/>
+          </a:p>
+        </p:txBody>
+      </p:sp>
+    </p:spTree>
+    <p:extLst>
+      <p:ext uri="{BB962C8B-B14F-4D97-AF65-F5344CB8AC3E}">
+        <p14:creationId xmlns:p14="http://schemas.microsoft.com/office/powerpoint/2010/main" val="2851845820"/>
+      </p:ext>
+    </p:extLst>
+  </p:cSld>
+  <p:clrMapOvr>
+    <a:masterClrMapping/>
+  </p:clrMapOvr>
+</p:sld>
+</file>
+
+<file path=ppt/slides/slide16.xml><?xml version="1.0" encoding="utf-8"?>
+<p:sld xmlns:a="http://schemas.openxmlformats.org/drawingml/2006/main" xmlns:r="http://schemas.openxmlformats.org/officeDocument/2006/relationships" xmlns:p="http://schemas.openxmlformats.org/presentationml/2006/main">
+  <p:cSld>
+    <p:spTree>
+      <p:nvGrpSpPr>
+        <p:cNvPr id="1" name=""/>
+        <p:cNvGrpSpPr/>
+        <p:nvPr/>
+      </p:nvGrpSpPr>
+      <p:grpSpPr>
+        <a:xfrm>
+          <a:off x="0" y="0"/>
+          <a:ext cx="0" cy="0"/>
+          <a:chOff x="0" y="0"/>
+          <a:chExt cx="0" cy="0"/>
+        </a:xfrm>
+      </p:grpSpPr>
+      <p:sp>
+        <p:nvSpPr>
+          <p:cNvPr id="2" name="Title 1">
+            <a:extLst>
+              <a:ext uri="{FF2B5EF4-FFF2-40B4-BE49-F238E27FC236}">
+                <a16:creationId xmlns:a16="http://schemas.microsoft.com/office/drawing/2014/main" id="{B9DAA0C3-85C1-956C-1F71-77B73911381A}"/>
+              </a:ext>
+            </a:extLst>
+          </p:cNvPr>
+          <p:cNvSpPr>
+            <a:spLocks noGrp="1"/>
+          </p:cNvSpPr>
+          <p:nvPr>
+            <p:ph type="title"/>
+          </p:nvPr>
+        </p:nvSpPr>
+        <p:spPr/>
+        <p:txBody>
+          <a:bodyPr/>
+          <a:lstStyle/>
+          <a:p>
+            <a:r>
+              <a:rPr lang="en-US" dirty="0"/>
+              <a:t>Teste </a:t>
+            </a:r>
+            <a:r>
+              <a:rPr lang="en-US" dirty="0" err="1"/>
+              <a:t>si</a:t>
+            </a:r>
+            <a:r>
+              <a:rPr lang="en-US" dirty="0"/>
+              <a:t> </a:t>
+            </a:r>
+            <a:r>
+              <a:rPr lang="en-US" dirty="0" err="1"/>
+              <a:t>rezultate</a:t>
+            </a:r>
+            <a:endParaRPr lang="ro-RO" dirty="0"/>
+          </a:p>
+        </p:txBody>
+      </p:sp>
+      <p:sp>
+        <p:nvSpPr>
+          <p:cNvPr id="3" name="Content Placeholder 2">
+            <a:extLst>
+              <a:ext uri="{FF2B5EF4-FFF2-40B4-BE49-F238E27FC236}">
+                <a16:creationId xmlns:a16="http://schemas.microsoft.com/office/drawing/2014/main" id="{2AB9D4FD-FA42-282B-2C51-880BADDA3F35}"/>
+              </a:ext>
+            </a:extLst>
+          </p:cNvPr>
+          <p:cNvSpPr>
+            <a:spLocks noGrp="1"/>
+          </p:cNvSpPr>
+          <p:nvPr>
+            <p:ph idx="1"/>
+          </p:nvPr>
+        </p:nvSpPr>
+        <p:spPr/>
+        <p:txBody>
+          <a:bodyPr/>
+          <a:lstStyle/>
+          <a:p>
+            <a:endParaRPr lang="ro-RO" dirty="0"/>
+          </a:p>
+        </p:txBody>
+      </p:sp>
+    </p:spTree>
+    <p:extLst>
+      <p:ext uri="{BB962C8B-B14F-4D97-AF65-F5344CB8AC3E}">
+        <p14:creationId xmlns:p14="http://schemas.microsoft.com/office/powerpoint/2010/main" val="1167266706"/>
+      </p:ext>
+    </p:extLst>
+  </p:cSld>
+  <p:clrMapOvr>
+    <a:masterClrMapping/>
+  </p:clrMapOvr>
+</p:sld>
+</file>
+
+<file path=ppt/slides/slide17.xml><?xml version="1.0" encoding="utf-8"?>
+<p:sld xmlns:a="http://schemas.openxmlformats.org/drawingml/2006/main" xmlns:r="http://schemas.openxmlformats.org/officeDocument/2006/relationships" xmlns:p="http://schemas.openxmlformats.org/presentationml/2006/main">
+  <p:cSld>
+    <p:spTree>
+      <p:nvGrpSpPr>
+        <p:cNvPr id="1" name=""/>
+        <p:cNvGrpSpPr/>
+        <p:nvPr/>
+      </p:nvGrpSpPr>
+      <p:grpSpPr>
+        <a:xfrm>
+          <a:off x="0" y="0"/>
+          <a:ext cx="0" cy="0"/>
+          <a:chOff x="0" y="0"/>
+          <a:chExt cx="0" cy="0"/>
+        </a:xfrm>
+      </p:grpSpPr>
+      <p:sp>
+        <p:nvSpPr>
+          <p:cNvPr id="2" name="Title 1">
+            <a:extLst>
+              <a:ext uri="{FF2B5EF4-FFF2-40B4-BE49-F238E27FC236}">
+                <a16:creationId xmlns:a16="http://schemas.microsoft.com/office/drawing/2014/main" id="{7ED5A5CB-42BA-4E52-0E3D-2E6ED4C00485}"/>
+              </a:ext>
+            </a:extLst>
+          </p:cNvPr>
+          <p:cNvSpPr>
+            <a:spLocks noGrp="1"/>
+          </p:cNvSpPr>
+          <p:nvPr>
+            <p:ph type="title"/>
+          </p:nvPr>
+        </p:nvSpPr>
+        <p:spPr/>
+        <p:txBody>
+          <a:bodyPr/>
+          <a:lstStyle/>
+          <a:p>
+            <a:r>
+              <a:rPr lang="en-US" dirty="0" err="1"/>
+              <a:t>Concluzii</a:t>
+            </a:r>
+            <a:endParaRPr lang="ro-RO" dirty="0"/>
+          </a:p>
+        </p:txBody>
+      </p:sp>
+      <p:sp>
+        <p:nvSpPr>
+          <p:cNvPr id="3" name="Content Placeholder 2">
+            <a:extLst>
+              <a:ext uri="{FF2B5EF4-FFF2-40B4-BE49-F238E27FC236}">
+                <a16:creationId xmlns:a16="http://schemas.microsoft.com/office/drawing/2014/main" id="{930DA853-5CBC-7D9C-4AA8-86831CB8CE33}"/>
+              </a:ext>
+            </a:extLst>
+          </p:cNvPr>
+          <p:cNvSpPr>
+            <a:spLocks noGrp="1"/>
+          </p:cNvSpPr>
+          <p:nvPr>
+            <p:ph idx="1"/>
+          </p:nvPr>
+        </p:nvSpPr>
+        <p:spPr/>
+        <p:txBody>
+          <a:bodyPr/>
+          <a:lstStyle/>
+          <a:p>
+            <a:endParaRPr lang="ro-RO"/>
+          </a:p>
+        </p:txBody>
+      </p:sp>
+    </p:spTree>
+    <p:extLst>
+      <p:ext uri="{BB962C8B-B14F-4D97-AF65-F5344CB8AC3E}">
+        <p14:creationId xmlns:p14="http://schemas.microsoft.com/office/powerpoint/2010/main" val="736913998"/>
+      </p:ext>
+    </p:extLst>
+  </p:cSld>
+  <p:clrMapOvr>
+    <a:masterClrMapping/>
+  </p:clrMapOvr>
+</p:sld>
+</file>
+
+<file path=ppt/slides/slide18.xml><?xml version="1.0" encoding="utf-8"?>
+<p:sld xmlns:a="http://schemas.openxmlformats.org/drawingml/2006/main" xmlns:r="http://schemas.openxmlformats.org/officeDocument/2006/relationships" xmlns:p="http://schemas.openxmlformats.org/presentationml/2006/main">
+  <p:cSld>
+    <p:spTree>
+      <p:nvGrpSpPr>
+        <p:cNvPr id="1" name=""/>
+        <p:cNvGrpSpPr/>
+        <p:nvPr/>
+      </p:nvGrpSpPr>
+      <p:grpSpPr>
+        <a:xfrm>
+          <a:off x="0" y="0"/>
+          <a:ext cx="0" cy="0"/>
+          <a:chOff x="0" y="0"/>
+          <a:chExt cx="0" cy="0"/>
+        </a:xfrm>
+      </p:grpSpPr>
+      <p:sp>
+        <p:nvSpPr>
+          <p:cNvPr id="2" name="Title 1">
+            <a:extLst>
+              <a:ext uri="{FF2B5EF4-FFF2-40B4-BE49-F238E27FC236}">
                 <a16:creationId xmlns:a16="http://schemas.microsoft.com/office/drawing/2014/main" id="{73CE673C-ABB5-E390-1078-C2EFE4185B61}"/>
               </a:ext>
             </a:extLst>
@@ -4182,10 +6046,233 @@
         </p:nvSpPr>
         <p:spPr/>
         <p:txBody>
-          <a:bodyPr/>
-          <a:lstStyle/>
-          <a:p>
-            <a:endParaRPr lang="ro-RO" dirty="0"/>
+          <a:bodyPr>
+            <a:normAutofit lnSpcReduction="10000"/>
+          </a:bodyPr>
+          <a:lstStyle/>
+          <a:p>
+            <a:pPr lvl="1"/>
+            <a:r>
+              <a:rPr lang="en-US" dirty="0" err="1"/>
+              <a:t>Airthings</a:t>
+            </a:r>
+            <a:endParaRPr lang="en-US" dirty="0"/>
+          </a:p>
+          <a:p>
+            <a:pPr lvl="2"/>
+            <a:r>
+              <a:rPr lang="en-US" dirty="0" err="1"/>
+              <a:t>Conexiune</a:t>
+            </a:r>
+            <a:r>
+              <a:rPr lang="en-US" dirty="0"/>
+              <a:t> Bluetooth </a:t>
+            </a:r>
+            <a:r>
+              <a:rPr lang="en-US" dirty="0" err="1"/>
+              <a:t>sau</a:t>
+            </a:r>
+            <a:r>
+              <a:rPr lang="en-US" dirty="0"/>
+              <a:t> </a:t>
+            </a:r>
+            <a:r>
+              <a:rPr lang="en-US" dirty="0" err="1"/>
+              <a:t>SmartLink</a:t>
+            </a:r>
+            <a:r>
+              <a:rPr lang="en-US" dirty="0"/>
+              <a:t> (</a:t>
+            </a:r>
+            <a:r>
+              <a:rPr lang="en-US" dirty="0" err="1"/>
+              <a:t>proprietar</a:t>
+            </a:r>
+            <a:r>
+              <a:rPr lang="en-US" dirty="0"/>
+              <a:t>)</a:t>
+            </a:r>
+          </a:p>
+          <a:p>
+            <a:pPr lvl="2"/>
+            <a:r>
+              <a:rPr lang="en-US" dirty="0" err="1"/>
+              <a:t>Esantionarea</a:t>
+            </a:r>
+            <a:r>
+              <a:rPr lang="en-US" dirty="0"/>
+              <a:t> </a:t>
+            </a:r>
+            <a:r>
+              <a:rPr lang="en-US" dirty="0" err="1"/>
+              <a:t>gazului</a:t>
+            </a:r>
+            <a:r>
+              <a:rPr lang="en-US" dirty="0"/>
+              <a:t> </a:t>
+            </a:r>
+            <a:r>
+              <a:rPr lang="en-US" dirty="0" err="1"/>
+              <a:t>radioactiv</a:t>
+            </a:r>
+            <a:r>
+              <a:rPr lang="en-US" dirty="0"/>
+              <a:t> Radon</a:t>
+            </a:r>
+          </a:p>
+          <a:p>
+            <a:pPr lvl="2"/>
+            <a:r>
+              <a:rPr lang="en-US" dirty="0" err="1"/>
+              <a:t>Functionare</a:t>
+            </a:r>
+            <a:r>
+              <a:rPr lang="en-US" dirty="0"/>
+              <a:t> pe </a:t>
+            </a:r>
+            <a:r>
+              <a:rPr lang="en-US" dirty="0" err="1"/>
+              <a:t>baterie</a:t>
+            </a:r>
+            <a:r>
+              <a:rPr lang="en-US" dirty="0"/>
+              <a:t> (15 </a:t>
+            </a:r>
+            <a:r>
+              <a:rPr lang="en-US" dirty="0" err="1"/>
+              <a:t>luni</a:t>
+            </a:r>
+            <a:r>
+              <a:rPr lang="en-US" dirty="0"/>
+              <a:t>).</a:t>
+            </a:r>
+          </a:p>
+          <a:p>
+            <a:pPr lvl="1"/>
+            <a:r>
+              <a:rPr lang="en-US" dirty="0" err="1"/>
+              <a:t>Awair</a:t>
+            </a:r>
+            <a:endParaRPr lang="en-US" dirty="0"/>
+          </a:p>
+          <a:p>
+            <a:pPr lvl="2"/>
+            <a:r>
+              <a:rPr lang="en-US" dirty="0" err="1"/>
+              <a:t>Conexiune</a:t>
+            </a:r>
+            <a:r>
+              <a:rPr lang="en-US" dirty="0"/>
+              <a:t> Bluetooth, Wi-Fi, LoRa</a:t>
+            </a:r>
+          </a:p>
+          <a:p>
+            <a:pPr lvl="2"/>
+            <a:r>
+              <a:rPr lang="en-US" dirty="0" err="1"/>
+              <a:t>Retea</a:t>
+            </a:r>
+            <a:r>
+              <a:rPr lang="en-US" dirty="0"/>
+              <a:t> mesh</a:t>
+            </a:r>
+          </a:p>
+          <a:p>
+            <a:pPr lvl="1"/>
+            <a:r>
+              <a:rPr lang="en-US" dirty="0"/>
+              <a:t>Air Quality Egg</a:t>
+            </a:r>
+          </a:p>
+          <a:p>
+            <a:pPr lvl="2"/>
+            <a:r>
+              <a:rPr lang="en-US" dirty="0" err="1"/>
+              <a:t>Platforma</a:t>
+            </a:r>
+            <a:r>
+              <a:rPr lang="en-US" dirty="0"/>
+              <a:t> de </a:t>
+            </a:r>
+            <a:r>
+              <a:rPr lang="en-US" dirty="0" err="1"/>
+              <a:t>dezvoltare</a:t>
+            </a:r>
+            <a:endParaRPr lang="en-US" dirty="0"/>
+          </a:p>
+          <a:p>
+            <a:pPr lvl="2"/>
+            <a:r>
+              <a:rPr lang="en-US" dirty="0" err="1"/>
+              <a:t>Harta</a:t>
+            </a:r>
+            <a:r>
+              <a:rPr lang="en-US" dirty="0"/>
+              <a:t> a </a:t>
+            </a:r>
+            <a:r>
+              <a:rPr lang="en-US" dirty="0" err="1"/>
+              <a:t>senzorilor</a:t>
+            </a:r>
+            <a:endParaRPr lang="en-US" dirty="0"/>
+          </a:p>
+          <a:p>
+            <a:pPr lvl="1"/>
+            <a:r>
+              <a:rPr lang="en-US" dirty="0"/>
+              <a:t>Purple Air	</a:t>
+            </a:r>
+          </a:p>
+          <a:p>
+            <a:pPr lvl="2"/>
+            <a:r>
+              <a:rPr lang="en-US" dirty="0" err="1"/>
+              <a:t>Spatii</a:t>
+            </a:r>
+            <a:r>
+              <a:rPr lang="en-US" dirty="0"/>
+              <a:t> </a:t>
+            </a:r>
+            <a:r>
+              <a:rPr lang="en-US" dirty="0" err="1"/>
+              <a:t>inchise</a:t>
+            </a:r>
+            <a:r>
+              <a:rPr lang="en-US" dirty="0"/>
+              <a:t>, </a:t>
+            </a:r>
+            <a:r>
+              <a:rPr lang="en-US" dirty="0" err="1"/>
+              <a:t>deschise</a:t>
+            </a:r>
+            <a:r>
+              <a:rPr lang="en-US" dirty="0"/>
+              <a:t> </a:t>
+            </a:r>
+            <a:r>
+              <a:rPr lang="en-US" dirty="0" err="1"/>
+              <a:t>si</a:t>
+            </a:r>
+            <a:r>
+              <a:rPr lang="en-US" dirty="0"/>
+              <a:t> industrial</a:t>
+            </a:r>
+          </a:p>
+          <a:p>
+            <a:pPr lvl="2"/>
+            <a:r>
+              <a:rPr lang="en-US" dirty="0" err="1"/>
+              <a:t>Harta</a:t>
+            </a:r>
+            <a:r>
+              <a:rPr lang="en-US" dirty="0"/>
+              <a:t> a </a:t>
+            </a:r>
+            <a:r>
+              <a:rPr lang="en-US" dirty="0" err="1"/>
+              <a:t>senzorilor</a:t>
+            </a:r>
+            <a:endParaRPr lang="en-US" dirty="0"/>
           </a:p>
         </p:txBody>
       </p:sp>
@@ -4205,6 +6292,14 @@
 <file path=ppt/slides/slide6.xml><?xml version="1.0" encoding="utf-8"?>
 <p:sld xmlns:a="http://schemas.openxmlformats.org/drawingml/2006/main" xmlns:r="http://schemas.openxmlformats.org/officeDocument/2006/relationships" xmlns:p="http://schemas.openxmlformats.org/presentationml/2006/main">
   <p:cSld>
+    <p:bg>
+      <p:bgPr>
+        <a:solidFill>
+          <a:schemeClr val="bg1"/>
+        </a:solidFill>
+        <a:effectLst/>
+      </p:bgPr>
+    </p:bg>
     <p:spTree>
       <p:nvGrpSpPr>
         <p:cNvPr id="1" name=""/>
@@ -4219,12 +6314,539 @@
           <a:chExt cx="0" cy="0"/>
         </a:xfrm>
       </p:grpSpPr>
-      <p:sp>
-        <p:nvSpPr>
-          <p:cNvPr id="2" name="Title 1">
-            <a:extLst>
-              <a:ext uri="{FF2B5EF4-FFF2-40B4-BE49-F238E27FC236}">
-                <a16:creationId xmlns:a16="http://schemas.microsoft.com/office/drawing/2014/main" id="{6904E23F-4F4C-6883-0247-537005388729}"/>
+      <p:sp useBgFill="1">
+        <p:nvSpPr>
+          <p:cNvPr id="40" name="Rectangle 39">
+            <a:extLst>
+              <a:ext uri="{FF2B5EF4-FFF2-40B4-BE49-F238E27FC236}">
+                <a16:creationId xmlns:a16="http://schemas.microsoft.com/office/drawing/2014/main" id="{6234BCC6-39B9-47D9-8BF8-C665401AE23C}"/>
+              </a:ext>
+              <a:ext uri="{C183D7F6-B498-43B3-948B-1728B52AA6E4}">
+                <adec:decorative xmlns:adec="http://schemas.microsoft.com/office/drawing/2017/decorative" val="1"/>
+              </a:ext>
+            </a:extLst>
+          </p:cNvPr>
+          <p:cNvSpPr>
+            <a:spLocks noGrp="1" noRot="1" noChangeAspect="1" noMove="1" noResize="1" noEditPoints="1" noAdjustHandles="1" noChangeArrowheads="1" noChangeShapeType="1" noTextEdit="1"/>
+          </p:cNvSpPr>
+          <p:nvPr>
+            <p:extLst>
+              <p:ext uri="{386F3935-93C4-4BCD-93E2-E3B085C9AB24}">
+                <p16:designElem xmlns:p16="http://schemas.microsoft.com/office/powerpoint/2015/main" val="1"/>
+              </p:ext>
+            </p:extLst>
+          </p:nvPr>
+        </p:nvSpPr>
+        <p:spPr>
+          <a:xfrm>
+            <a:off x="0" y="0"/>
+            <a:ext cx="12192000" cy="6858000"/>
+          </a:xfrm>
+          <a:prstGeom prst="rect">
+            <a:avLst/>
+          </a:prstGeom>
+          <a:ln>
+            <a:noFill/>
+          </a:ln>
+        </p:spPr>
+        <p:style>
+          <a:lnRef idx="2">
+            <a:schemeClr val="accent1">
+              <a:shade val="50000"/>
+            </a:schemeClr>
+          </a:lnRef>
+          <a:fillRef idx="1">
+            <a:schemeClr val="accent1"/>
+          </a:fillRef>
+          <a:effectRef idx="0">
+            <a:schemeClr val="accent1"/>
+          </a:effectRef>
+          <a:fontRef idx="minor">
+            <a:schemeClr val="lt1"/>
+          </a:fontRef>
+        </p:style>
+        <p:txBody>
+          <a:bodyPr rtlCol="0" anchor="ctr"/>
+          <a:lstStyle/>
+          <a:p>
+            <a:pPr algn="ctr"/>
+            <a:endParaRPr lang="en-US"/>
+          </a:p>
+        </p:txBody>
+      </p:sp>
+      <p:pic>
+        <p:nvPicPr>
+          <p:cNvPr id="35" name="Content Placeholder 34" descr="A map of the world with different colored dots&#10;&#10;Description automatically generated">
+            <a:extLst>
+              <a:ext uri="{FF2B5EF4-FFF2-40B4-BE49-F238E27FC236}">
+                <a16:creationId xmlns:a16="http://schemas.microsoft.com/office/drawing/2014/main" id="{8ACE4F44-461E-2ABA-E787-EF105979FA5C}"/>
+              </a:ext>
+            </a:extLst>
+          </p:cNvPr>
+          <p:cNvPicPr>
+            <a:picLocks noGrp="1" noChangeAspect="1"/>
+          </p:cNvPicPr>
+          <p:nvPr>
+            <p:ph sz="half" idx="2"/>
+          </p:nvPr>
+        </p:nvPicPr>
+        <p:blipFill>
+          <a:blip r:embed="rId2">
+            <a:extLst>
+              <a:ext uri="{28A0092B-C50C-407E-A947-70E740481C1C}">
+                <a14:useLocalDpi xmlns:a14="http://schemas.microsoft.com/office/drawing/2010/main" val="0"/>
+              </a:ext>
+            </a:extLst>
+          </a:blip>
+          <a:srcRect r="3341" b="-2"/>
+          <a:stretch/>
+        </p:blipFill>
+        <p:spPr>
+          <a:xfrm>
+            <a:off x="4883025" y="10"/>
+            <a:ext cx="7308975" cy="3364982"/>
+          </a:xfrm>
+          <a:custGeom>
+            <a:avLst/>
+            <a:gdLst/>
+            <a:ahLst/>
+            <a:cxnLst/>
+            <a:rect l="l" t="t" r="r" b="b"/>
+            <a:pathLst>
+              <a:path w="7308975" h="3364992">
+                <a:moveTo>
+                  <a:pt x="0" y="0"/>
+                </a:moveTo>
+                <a:lnTo>
+                  <a:pt x="7308975" y="0"/>
+                </a:lnTo>
+                <a:lnTo>
+                  <a:pt x="7308975" y="3364992"/>
+                </a:lnTo>
+                <a:lnTo>
+                  <a:pt x="1210305" y="3364992"/>
+                </a:lnTo>
+                <a:lnTo>
+                  <a:pt x="1192705" y="2943200"/>
+                </a:lnTo>
+                <a:cubicBezTo>
+                  <a:pt x="1098874" y="1825108"/>
+                  <a:pt x="684692" y="821621"/>
+                  <a:pt x="62981" y="69271"/>
+                </a:cubicBezTo>
+                <a:close/>
+              </a:path>
+            </a:pathLst>
+          </a:custGeom>
+        </p:spPr>
+      </p:pic>
+      <p:pic>
+        <p:nvPicPr>
+          <p:cNvPr id="33" name="Content Placeholder 32" descr="A map of the world with different colored circles&#10;&#10;Description automatically generated">
+            <a:extLst>
+              <a:ext uri="{FF2B5EF4-FFF2-40B4-BE49-F238E27FC236}">
+                <a16:creationId xmlns:a16="http://schemas.microsoft.com/office/drawing/2014/main" id="{0478F126-41DF-38C5-AC86-5B5D011FC472}"/>
+              </a:ext>
+            </a:extLst>
+          </p:cNvPr>
+          <p:cNvPicPr>
+            <a:picLocks noGrp="1" noChangeAspect="1"/>
+          </p:cNvPicPr>
+          <p:nvPr>
+            <p:ph sz="half" idx="1"/>
+          </p:nvPr>
+        </p:nvPicPr>
+        <p:blipFill>
+          <a:blip r:embed="rId3">
+            <a:extLst>
+              <a:ext uri="{28A0092B-C50C-407E-A947-70E740481C1C}">
+                <a14:useLocalDpi xmlns:a14="http://schemas.microsoft.com/office/drawing/2010/main" val="0"/>
+              </a:ext>
+            </a:extLst>
+          </a:blip>
+          <a:srcRect r="-2" b="453"/>
+          <a:stretch/>
+        </p:blipFill>
+        <p:spPr>
+          <a:xfrm>
+            <a:off x="4883025" y="3493008"/>
+            <a:ext cx="7308975" cy="3364992"/>
+          </a:xfrm>
+          <a:custGeom>
+            <a:avLst/>
+            <a:gdLst/>
+            <a:ahLst/>
+            <a:cxnLst/>
+            <a:rect l="l" t="t" r="r" b="b"/>
+            <a:pathLst>
+              <a:path w="7308975" h="3364992">
+                <a:moveTo>
+                  <a:pt x="1210305" y="0"/>
+                </a:moveTo>
+                <a:lnTo>
+                  <a:pt x="7308975" y="0"/>
+                </a:lnTo>
+                <a:lnTo>
+                  <a:pt x="7308975" y="3364992"/>
+                </a:lnTo>
+                <a:lnTo>
+                  <a:pt x="0" y="3364992"/>
+                </a:lnTo>
+                <a:lnTo>
+                  <a:pt x="62981" y="3295722"/>
+                </a:lnTo>
+                <a:cubicBezTo>
+                  <a:pt x="684692" y="2543371"/>
+                  <a:pt x="1098874" y="1539884"/>
+                  <a:pt x="1192705" y="421793"/>
+                </a:cubicBezTo>
+                <a:close/>
+              </a:path>
+            </a:pathLst>
+          </a:custGeom>
+        </p:spPr>
+      </p:pic>
+      <p:sp useBgFill="1">
+        <p:nvSpPr>
+          <p:cNvPr id="45" name="Freeform: Shape 44">
+            <a:extLst>
+              <a:ext uri="{FF2B5EF4-FFF2-40B4-BE49-F238E27FC236}">
+                <a16:creationId xmlns:a16="http://schemas.microsoft.com/office/drawing/2014/main" id="{72A9CE9D-DAC3-40AF-B504-78A64A909F9D}"/>
+              </a:ext>
+              <a:ext uri="{C183D7F6-B498-43B3-948B-1728B52AA6E4}">
+                <adec:decorative xmlns:adec="http://schemas.microsoft.com/office/drawing/2017/decorative" val="1"/>
+              </a:ext>
+            </a:extLst>
+          </p:cNvPr>
+          <p:cNvSpPr>
+            <a:spLocks noGrp="1" noRot="1" noChangeAspect="1" noMove="1" noResize="1" noEditPoints="1" noAdjustHandles="1" noChangeArrowheads="1" noChangeShapeType="1" noTextEdit="1"/>
+          </p:cNvSpPr>
+          <p:nvPr>
+            <p:extLst>
+              <p:ext uri="{386F3935-93C4-4BCD-93E2-E3B085C9AB24}">
+                <p16:designElem xmlns:p16="http://schemas.microsoft.com/office/powerpoint/2015/main" val="1"/>
+              </p:ext>
+            </p:extLst>
+          </p:nvPr>
+        </p:nvSpPr>
+        <p:spPr>
+          <a:xfrm>
+            <a:off x="0" y="0"/>
+            <a:ext cx="6096001" cy="6858000"/>
+          </a:xfrm>
+          <a:custGeom>
+            <a:avLst/>
+            <a:gdLst>
+              <a:gd name="connsiteX0" fmla="*/ 0 w 6096001"/>
+              <a:gd name="connsiteY0" fmla="*/ 0 h 6858000"/>
+              <a:gd name="connsiteX1" fmla="*/ 4883024 w 6096001"/>
+              <a:gd name="connsiteY1" fmla="*/ 0 h 6858000"/>
+              <a:gd name="connsiteX2" fmla="*/ 4946006 w 6096001"/>
+              <a:gd name="connsiteY2" fmla="*/ 69271 h 6858000"/>
+              <a:gd name="connsiteX3" fmla="*/ 6096001 w 6096001"/>
+              <a:gd name="connsiteY3" fmla="*/ 3429000 h 6858000"/>
+              <a:gd name="connsiteX4" fmla="*/ 4946006 w 6096001"/>
+              <a:gd name="connsiteY4" fmla="*/ 6788730 h 6858000"/>
+              <a:gd name="connsiteX5" fmla="*/ 4883024 w 6096001"/>
+              <a:gd name="connsiteY5" fmla="*/ 6858000 h 6858000"/>
+              <a:gd name="connsiteX6" fmla="*/ 0 w 6096001"/>
+              <a:gd name="connsiteY6" fmla="*/ 6858000 h 6858000"/>
+            </a:gdLst>
+            <a:ahLst/>
+            <a:cxnLst>
+              <a:cxn ang="0">
+                <a:pos x="connsiteX0" y="connsiteY0"/>
+              </a:cxn>
+              <a:cxn ang="0">
+                <a:pos x="connsiteX1" y="connsiteY1"/>
+              </a:cxn>
+              <a:cxn ang="0">
+                <a:pos x="connsiteX2" y="connsiteY2"/>
+              </a:cxn>
+              <a:cxn ang="0">
+                <a:pos x="connsiteX3" y="connsiteY3"/>
+              </a:cxn>
+              <a:cxn ang="0">
+                <a:pos x="connsiteX4" y="connsiteY4"/>
+              </a:cxn>
+              <a:cxn ang="0">
+                <a:pos x="connsiteX5" y="connsiteY5"/>
+              </a:cxn>
+              <a:cxn ang="0">
+                <a:pos x="connsiteX6" y="connsiteY6"/>
+              </a:cxn>
+            </a:cxnLst>
+            <a:rect l="l" t="t" r="r" b="b"/>
+            <a:pathLst>
+              <a:path w="6096001" h="6858000">
+                <a:moveTo>
+                  <a:pt x="0" y="0"/>
+                </a:moveTo>
+                <a:lnTo>
+                  <a:pt x="4883024" y="0"/>
+                </a:lnTo>
+                <a:lnTo>
+                  <a:pt x="4946006" y="69271"/>
+                </a:lnTo>
+                <a:cubicBezTo>
+                  <a:pt x="5656532" y="929100"/>
+                  <a:pt x="6096001" y="2116944"/>
+                  <a:pt x="6096001" y="3429000"/>
+                </a:cubicBezTo>
+                <a:cubicBezTo>
+                  <a:pt x="6096001" y="4741056"/>
+                  <a:pt x="5656532" y="5928900"/>
+                  <a:pt x="4946006" y="6788730"/>
+                </a:cubicBezTo>
+                <a:lnTo>
+                  <a:pt x="4883024" y="6858000"/>
+                </a:lnTo>
+                <a:lnTo>
+                  <a:pt x="0" y="6858000"/>
+                </a:lnTo>
+                <a:close/>
+              </a:path>
+            </a:pathLst>
+          </a:custGeom>
+          <a:ln w="9525">
+            <a:solidFill>
+              <a:srgbClr val="EFEFEF"/>
+            </a:solidFill>
+          </a:ln>
+          <a:effectLst>
+            <a:outerShdw blurRad="50800" dist="38100" algn="l" rotWithShape="0">
+              <a:schemeClr val="bg1">
+                <a:lumMod val="85000"/>
+                <a:alpha val="30000"/>
+              </a:schemeClr>
+            </a:outerShdw>
+          </a:effectLst>
+        </p:spPr>
+        <p:style>
+          <a:lnRef idx="2">
+            <a:schemeClr val="accent1">
+              <a:shade val="50000"/>
+            </a:schemeClr>
+          </a:lnRef>
+          <a:fillRef idx="1">
+            <a:schemeClr val="accent1"/>
+          </a:fillRef>
+          <a:effectRef idx="0">
+            <a:schemeClr val="accent1"/>
+          </a:effectRef>
+          <a:fontRef idx="minor">
+            <a:schemeClr val="lt1"/>
+          </a:fontRef>
+        </p:style>
+        <p:txBody>
+          <a:bodyPr wrap="square" rtlCol="0" anchor="ctr">
+            <a:noAutofit/>
+          </a:bodyPr>
+          <a:lstStyle/>
+          <a:p>
+            <a:pPr marL="0" marR="0" lvl="0" indent="0" algn="ctr" defTabSz="914400" rtl="0" eaLnBrk="1" fontAlgn="auto" latinLnBrk="0" hangingPunct="1">
+              <a:lnSpc>
+                <a:spcPct val="100000"/>
+              </a:lnSpc>
+              <a:spcBef>
+                <a:spcPts val="0"/>
+              </a:spcBef>
+              <a:spcAft>
+                <a:spcPts val="0"/>
+              </a:spcAft>
+              <a:buClrTx/>
+              <a:buSzTx/>
+              <a:buFontTx/>
+              <a:buNone/>
+              <a:tabLst/>
+              <a:defRPr/>
+            </a:pPr>
+            <a:endParaRPr kumimoji="0" lang="en-US" sz="1800" b="0" i="0" u="none" strike="noStrike" kern="1200" cap="none" spc="0" normalizeH="0" baseline="0" noProof="0">
+              <a:ln>
+                <a:noFill/>
+              </a:ln>
+              <a:solidFill>
+                <a:prstClr val="white"/>
+              </a:solidFill>
+              <a:effectLst/>
+              <a:uLnTx/>
+              <a:uFillTx/>
+              <a:latin typeface="Calibri" panose="020F0502020204030204"/>
+              <a:ea typeface="+mn-ea"/>
+              <a:cs typeface="+mn-cs"/>
+            </a:endParaRPr>
+          </a:p>
+        </p:txBody>
+      </p:sp>
+      <p:sp useBgFill="1">
+        <p:nvSpPr>
+          <p:cNvPr id="44" name="Freeform: Shape 43">
+            <a:extLst>
+              <a:ext uri="{FF2B5EF4-FFF2-40B4-BE49-F238E27FC236}">
+                <a16:creationId xmlns:a16="http://schemas.microsoft.com/office/drawing/2014/main" id="{506D7452-6CDE-4381-86CE-07B2459383D5}"/>
+              </a:ext>
+              <a:ext uri="{C183D7F6-B498-43B3-948B-1728B52AA6E4}">
+                <adec:decorative xmlns:adec="http://schemas.microsoft.com/office/drawing/2017/decorative" val="1"/>
+              </a:ext>
+            </a:extLst>
+          </p:cNvPr>
+          <p:cNvSpPr>
+            <a:spLocks noGrp="1" noRot="1" noChangeAspect="1" noMove="1" noResize="1" noEditPoints="1" noAdjustHandles="1" noChangeArrowheads="1" noChangeShapeType="1" noTextEdit="1"/>
+          </p:cNvSpPr>
+          <p:nvPr>
+            <p:extLst>
+              <p:ext uri="{386F3935-93C4-4BCD-93E2-E3B085C9AB24}">
+                <p16:designElem xmlns:p16="http://schemas.microsoft.com/office/powerpoint/2015/main" val="1"/>
+              </p:ext>
+            </p:extLst>
+          </p:nvPr>
+        </p:nvSpPr>
+        <p:spPr>
+          <a:xfrm>
+            <a:off x="1" y="0"/>
+            <a:ext cx="6087332" cy="6858000"/>
+          </a:xfrm>
+          <a:custGeom>
+            <a:avLst/>
+            <a:gdLst>
+              <a:gd name="connsiteX0" fmla="*/ 0 w 6087332"/>
+              <a:gd name="connsiteY0" fmla="*/ 0 h 6858000"/>
+              <a:gd name="connsiteX1" fmla="*/ 4874355 w 6087332"/>
+              <a:gd name="connsiteY1" fmla="*/ 0 h 6858000"/>
+              <a:gd name="connsiteX2" fmla="*/ 4937337 w 6087332"/>
+              <a:gd name="connsiteY2" fmla="*/ 69271 h 6858000"/>
+              <a:gd name="connsiteX3" fmla="*/ 6087332 w 6087332"/>
+              <a:gd name="connsiteY3" fmla="*/ 3429000 h 6858000"/>
+              <a:gd name="connsiteX4" fmla="*/ 4937337 w 6087332"/>
+              <a:gd name="connsiteY4" fmla="*/ 6788730 h 6858000"/>
+              <a:gd name="connsiteX5" fmla="*/ 4874355 w 6087332"/>
+              <a:gd name="connsiteY5" fmla="*/ 6858000 h 6858000"/>
+              <a:gd name="connsiteX6" fmla="*/ 0 w 6087332"/>
+              <a:gd name="connsiteY6" fmla="*/ 6858000 h 6858000"/>
+            </a:gdLst>
+            <a:ahLst/>
+            <a:cxnLst>
+              <a:cxn ang="0">
+                <a:pos x="connsiteX0" y="connsiteY0"/>
+              </a:cxn>
+              <a:cxn ang="0">
+                <a:pos x="connsiteX1" y="connsiteY1"/>
+              </a:cxn>
+              <a:cxn ang="0">
+                <a:pos x="connsiteX2" y="connsiteY2"/>
+              </a:cxn>
+              <a:cxn ang="0">
+                <a:pos x="connsiteX3" y="connsiteY3"/>
+              </a:cxn>
+              <a:cxn ang="0">
+                <a:pos x="connsiteX4" y="connsiteY4"/>
+              </a:cxn>
+              <a:cxn ang="0">
+                <a:pos x="connsiteX5" y="connsiteY5"/>
+              </a:cxn>
+              <a:cxn ang="0">
+                <a:pos x="connsiteX6" y="connsiteY6"/>
+              </a:cxn>
+            </a:cxnLst>
+            <a:rect l="l" t="t" r="r" b="b"/>
+            <a:pathLst>
+              <a:path w="6087332" h="6858000">
+                <a:moveTo>
+                  <a:pt x="0" y="0"/>
+                </a:moveTo>
+                <a:lnTo>
+                  <a:pt x="4874355" y="0"/>
+                </a:lnTo>
+                <a:lnTo>
+                  <a:pt x="4937337" y="69271"/>
+                </a:lnTo>
+                <a:cubicBezTo>
+                  <a:pt x="5647863" y="929100"/>
+                  <a:pt x="6087332" y="2116944"/>
+                  <a:pt x="6087332" y="3429000"/>
+                </a:cubicBezTo>
+                <a:cubicBezTo>
+                  <a:pt x="6087332" y="4741056"/>
+                  <a:pt x="5647863" y="5928900"/>
+                  <a:pt x="4937337" y="6788730"/>
+                </a:cubicBezTo>
+                <a:lnTo>
+                  <a:pt x="4874355" y="6858000"/>
+                </a:lnTo>
+                <a:lnTo>
+                  <a:pt x="0" y="6858000"/>
+                </a:lnTo>
+                <a:close/>
+              </a:path>
+            </a:pathLst>
+          </a:custGeom>
+          <a:ln w="9525">
+            <a:noFill/>
+          </a:ln>
+          <a:effectLst/>
+        </p:spPr>
+        <p:style>
+          <a:lnRef idx="2">
+            <a:schemeClr val="accent1">
+              <a:shade val="50000"/>
+            </a:schemeClr>
+          </a:lnRef>
+          <a:fillRef idx="1">
+            <a:schemeClr val="accent1"/>
+          </a:fillRef>
+          <a:effectRef idx="0">
+            <a:schemeClr val="accent1"/>
+          </a:effectRef>
+          <a:fontRef idx="minor">
+            <a:schemeClr val="lt1"/>
+          </a:fontRef>
+        </p:style>
+        <p:txBody>
+          <a:bodyPr wrap="square" rtlCol="0" anchor="ctr">
+            <a:noAutofit/>
+          </a:bodyPr>
+          <a:lstStyle/>
+          <a:p>
+            <a:pPr marL="0" marR="0" lvl="0" indent="0" algn="ctr" defTabSz="914400" rtl="0" eaLnBrk="1" fontAlgn="auto" latinLnBrk="0" hangingPunct="1">
+              <a:lnSpc>
+                <a:spcPct val="100000"/>
+              </a:lnSpc>
+              <a:spcBef>
+                <a:spcPts val="0"/>
+              </a:spcBef>
+              <a:spcAft>
+                <a:spcPts val="0"/>
+              </a:spcAft>
+              <a:buClrTx/>
+              <a:buSzTx/>
+              <a:buFontTx/>
+              <a:buNone/>
+              <a:tabLst/>
+              <a:defRPr/>
+            </a:pPr>
+            <a:endParaRPr kumimoji="0" lang="en-US" sz="1800" b="0" i="0" u="none" strike="noStrike" kern="1200" cap="none" spc="0" normalizeH="0" baseline="0" noProof="0">
+              <a:ln>
+                <a:noFill/>
+              </a:ln>
+              <a:solidFill>
+                <a:prstClr val="white"/>
+              </a:solidFill>
+              <a:effectLst/>
+              <a:uLnTx/>
+              <a:uFillTx/>
+              <a:latin typeface="Calibri" panose="020F0502020204030204"/>
+              <a:ea typeface="+mn-ea"/>
+              <a:cs typeface="+mn-cs"/>
+            </a:endParaRPr>
+          </a:p>
+        </p:txBody>
+      </p:sp>
+      <p:sp>
+        <p:nvSpPr>
+          <p:cNvPr id="29" name="Title 28">
+            <a:extLst>
+              <a:ext uri="{FF2B5EF4-FFF2-40B4-BE49-F238E27FC236}">
+                <a16:creationId xmlns:a16="http://schemas.microsoft.com/office/drawing/2014/main" id="{359D7FCA-4589-80F3-BA8F-1D448FF1F0CA}"/>
               </a:ext>
             </a:extLst>
           </p:cNvPr>
@@ -4235,52 +6857,236 @@
             <p:ph type="title"/>
           </p:nvPr>
         </p:nvSpPr>
-        <p:spPr/>
-        <p:txBody>
-          <a:bodyPr/>
-          <a:lstStyle/>
-          <a:p>
-            <a:r>
-              <a:rPr lang="en-US" dirty="0"/>
-              <a:t>Solutia </a:t>
-            </a:r>
-            <a:r>
-              <a:rPr lang="en-US" dirty="0" err="1"/>
-              <a:t>Aleasa</a:t>
-            </a:r>
-            <a:endParaRPr lang="ro-RO" dirty="0"/>
-          </a:p>
-        </p:txBody>
-      </p:sp>
-      <p:sp>
-        <p:nvSpPr>
-          <p:cNvPr id="3" name="Content Placeholder 2">
-            <a:extLst>
-              <a:ext uri="{FF2B5EF4-FFF2-40B4-BE49-F238E27FC236}">
-                <a16:creationId xmlns:a16="http://schemas.microsoft.com/office/drawing/2014/main" id="{7105036C-C24C-F59E-83AF-B69E1DD13616}"/>
-              </a:ext>
-            </a:extLst>
-          </p:cNvPr>
-          <p:cNvSpPr>
-            <a:spLocks noGrp="1"/>
-          </p:cNvSpPr>
-          <p:nvPr>
-            <p:ph idx="1"/>
-          </p:nvPr>
-        </p:nvSpPr>
-        <p:spPr/>
-        <p:txBody>
-          <a:bodyPr/>
-          <a:lstStyle/>
-          <a:p>
-            <a:endParaRPr lang="ro-RO"/>
+        <p:spPr>
+          <a:xfrm>
+            <a:off x="480430" y="1293454"/>
+            <a:ext cx="5019074" cy="3212024"/>
+          </a:xfrm>
+        </p:spPr>
+        <p:txBody>
+          <a:bodyPr vert="horz" lIns="91440" tIns="45720" rIns="91440" bIns="45720" rtlCol="0" anchor="b">
+            <a:normAutofit/>
+          </a:bodyPr>
+          <a:lstStyle/>
+          <a:p>
+            <a:r>
+              <a:rPr lang="en-US" sz="5400" kern="1200" dirty="0" err="1">
+                <a:solidFill>
+                  <a:schemeClr val="tx1"/>
+                </a:solidFill>
+                <a:latin typeface="+mj-lt"/>
+                <a:ea typeface="+mj-ea"/>
+                <a:cs typeface="+mj-cs"/>
+              </a:rPr>
+              <a:t>PurpleAir</a:t>
+            </a:r>
+            <a:br>
+              <a:rPr lang="en-US" sz="5400" kern="1200" dirty="0">
+                <a:solidFill>
+                  <a:schemeClr val="tx1"/>
+                </a:solidFill>
+                <a:latin typeface="+mj-lt"/>
+                <a:ea typeface="+mj-ea"/>
+                <a:cs typeface="+mj-cs"/>
+              </a:rPr>
+            </a:br>
+            <a:br>
+              <a:rPr lang="en-US" sz="5400" kern="1200" dirty="0">
+                <a:solidFill>
+                  <a:schemeClr val="tx1"/>
+                </a:solidFill>
+                <a:latin typeface="+mj-lt"/>
+                <a:ea typeface="+mj-ea"/>
+                <a:cs typeface="+mj-cs"/>
+              </a:rPr>
+            </a:br>
+            <a:r>
+              <a:rPr lang="en-US" sz="5400" kern="1200" dirty="0" err="1">
+                <a:solidFill>
+                  <a:schemeClr val="tx1"/>
+                </a:solidFill>
+                <a:latin typeface="+mj-lt"/>
+                <a:ea typeface="+mj-ea"/>
+                <a:cs typeface="+mj-cs"/>
+              </a:rPr>
+              <a:t>AirQualityEgg</a:t>
+            </a:r>
+            <a:endParaRPr lang="en-US" sz="5400" kern="1200" dirty="0">
+              <a:solidFill>
+                <a:schemeClr val="tx1"/>
+              </a:solidFill>
+              <a:latin typeface="+mj-lt"/>
+              <a:ea typeface="+mj-ea"/>
+              <a:cs typeface="+mj-cs"/>
+            </a:endParaRPr>
+          </a:p>
+        </p:txBody>
+      </p:sp>
+      <p:sp>
+        <p:nvSpPr>
+          <p:cNvPr id="46" name="Rectangle 45">
+            <a:extLst>
+              <a:ext uri="{FF2B5EF4-FFF2-40B4-BE49-F238E27FC236}">
+                <a16:creationId xmlns:a16="http://schemas.microsoft.com/office/drawing/2014/main" id="{762DA937-8B55-4317-BD32-98D7AF30E39E}"/>
+              </a:ext>
+              <a:ext uri="{C183D7F6-B498-43B3-948B-1728B52AA6E4}">
+                <adec:decorative xmlns:adec="http://schemas.microsoft.com/office/drawing/2017/decorative" val="1"/>
+              </a:ext>
+            </a:extLst>
+          </p:cNvPr>
+          <p:cNvSpPr>
+            <a:spLocks noGrp="1" noRot="1" noChangeAspect="1" noMove="1" noResize="1" noEditPoints="1" noAdjustHandles="1" noChangeArrowheads="1" noChangeShapeType="1" noTextEdit="1"/>
+          </p:cNvSpPr>
+          <p:nvPr>
+            <p:extLst>
+              <p:ext uri="{386F3935-93C4-4BCD-93E2-E3B085C9AB24}">
+                <p16:designElem xmlns:p16="http://schemas.microsoft.com/office/powerpoint/2015/main" val="1"/>
+              </p:ext>
+            </p:extLst>
+          </p:nvPr>
+        </p:nvSpPr>
+        <p:spPr>
+          <a:xfrm rot="5400000">
+            <a:off x="767989" y="346791"/>
+            <a:ext cx="146304" cy="704088"/>
+          </a:xfrm>
+          <a:prstGeom prst="rect">
+            <a:avLst/>
+          </a:prstGeom>
+          <a:solidFill>
+            <a:schemeClr val="accent2"/>
+          </a:solidFill>
+          <a:ln>
+            <a:noFill/>
+          </a:ln>
+        </p:spPr>
+        <p:style>
+          <a:lnRef idx="2">
+            <a:schemeClr val="accent1">
+              <a:shade val="50000"/>
+            </a:schemeClr>
+          </a:lnRef>
+          <a:fillRef idx="1">
+            <a:schemeClr val="accent1"/>
+          </a:fillRef>
+          <a:effectRef idx="0">
+            <a:schemeClr val="accent1"/>
+          </a:effectRef>
+          <a:fontRef idx="minor">
+            <a:schemeClr val="lt1"/>
+          </a:fontRef>
+        </p:style>
+        <p:txBody>
+          <a:bodyPr rtlCol="0" anchor="ctr"/>
+          <a:lstStyle/>
+          <a:p>
+            <a:pPr algn="ctr"/>
+            <a:endParaRPr lang="en-US">
+              <a:solidFill>
+                <a:prstClr val="white"/>
+              </a:solidFill>
+              <a:latin typeface="Avenir Next LT Pro"/>
+            </a:endParaRPr>
+          </a:p>
+        </p:txBody>
+      </p:sp>
+      <p:sp>
+        <p:nvSpPr>
+          <p:cNvPr id="48" name="Rectangle 47">
+            <a:extLst>
+              <a:ext uri="{FF2B5EF4-FFF2-40B4-BE49-F238E27FC236}">
+                <a16:creationId xmlns:a16="http://schemas.microsoft.com/office/drawing/2014/main" id="{C52EE5A8-045B-4D39-8ED1-513334085EEC}"/>
+              </a:ext>
+              <a:ext uri="{C183D7F6-B498-43B3-948B-1728B52AA6E4}">
+                <adec:decorative xmlns:adec="http://schemas.microsoft.com/office/drawing/2017/decorative" val="1"/>
+              </a:ext>
+            </a:extLst>
+          </p:cNvPr>
+          <p:cNvSpPr>
+            <a:spLocks noGrp="1" noRot="1" noChangeAspect="1" noMove="1" noResize="1" noEditPoints="1" noAdjustHandles="1" noChangeArrowheads="1" noChangeShapeType="1" noTextEdit="1"/>
+          </p:cNvSpPr>
+          <p:nvPr>
+            <p:extLst>
+              <p:ext uri="{386F3935-93C4-4BCD-93E2-E3B085C9AB24}">
+                <p16:designElem xmlns:p16="http://schemas.microsoft.com/office/powerpoint/2015/main" val="1"/>
+              </p:ext>
+            </p:extLst>
+          </p:nvPr>
+        </p:nvSpPr>
+        <p:spPr>
+          <a:xfrm>
+            <a:off x="489098" y="4461119"/>
+            <a:ext cx="5019074" cy="18288"/>
+          </a:xfrm>
+          <a:prstGeom prst="rect">
+            <a:avLst/>
+          </a:prstGeom>
+          <a:solidFill>
+            <a:srgbClr val="D5D5D5"/>
+          </a:solidFill>
+          <a:ln w="3175">
+            <a:noFill/>
+          </a:ln>
+          <a:effectLst/>
+        </p:spPr>
+        <p:style>
+          <a:lnRef idx="2">
+            <a:schemeClr val="accent1">
+              <a:shade val="50000"/>
+            </a:schemeClr>
+          </a:lnRef>
+          <a:fillRef idx="1">
+            <a:schemeClr val="accent1"/>
+          </a:fillRef>
+          <a:effectRef idx="0">
+            <a:schemeClr val="accent1"/>
+          </a:effectRef>
+          <a:fontRef idx="minor">
+            <a:schemeClr val="lt1"/>
+          </a:fontRef>
+        </p:style>
+        <p:txBody>
+          <a:bodyPr rtlCol="0" anchor="ctr"/>
+          <a:lstStyle/>
+          <a:p>
+            <a:pPr marL="0" marR="0" lvl="0" indent="0" algn="ctr" defTabSz="914400" rtl="0" eaLnBrk="1" fontAlgn="auto" latinLnBrk="0" hangingPunct="1">
+              <a:lnSpc>
+                <a:spcPct val="100000"/>
+              </a:lnSpc>
+              <a:spcBef>
+                <a:spcPts val="0"/>
+              </a:spcBef>
+              <a:spcAft>
+                <a:spcPts val="0"/>
+              </a:spcAft>
+              <a:buClrTx/>
+              <a:buSzTx/>
+              <a:buFontTx/>
+              <a:buNone/>
+              <a:tabLst/>
+              <a:defRPr/>
+            </a:pPr>
+            <a:endParaRPr kumimoji="0" lang="en-US" sz="1800" b="0" i="0" u="none" strike="noStrike" kern="1200" cap="none" spc="0" normalizeH="0" baseline="0" noProof="0">
+              <a:ln>
+                <a:noFill/>
+              </a:ln>
+              <a:solidFill>
+                <a:prstClr val="white"/>
+              </a:solidFill>
+              <a:effectLst/>
+              <a:uLnTx/>
+              <a:uFillTx/>
+              <a:latin typeface="Calibri" panose="020F0502020204030204"/>
+              <a:ea typeface="+mn-ea"/>
+              <a:cs typeface="+mn-cs"/>
+            </a:endParaRPr>
           </a:p>
         </p:txBody>
       </p:sp>
     </p:spTree>
     <p:extLst>
       <p:ext uri="{BB962C8B-B14F-4D97-AF65-F5344CB8AC3E}">
-        <p14:creationId xmlns:p14="http://schemas.microsoft.com/office/powerpoint/2010/main" val="820083394"/>
+        <p14:creationId xmlns:p14="http://schemas.microsoft.com/office/powerpoint/2010/main" val="661519129"/>
       </p:ext>
     </p:extLst>
   </p:cSld>
@@ -4312,7 +7118,7 @@
           <p:cNvPr id="2" name="Title 1">
             <a:extLst>
               <a:ext uri="{FF2B5EF4-FFF2-40B4-BE49-F238E27FC236}">
-                <a16:creationId xmlns:a16="http://schemas.microsoft.com/office/drawing/2014/main" id="{EF5FD5CF-C8DD-252A-2FA5-02978D23B94F}"/>
+                <a16:creationId xmlns:a16="http://schemas.microsoft.com/office/drawing/2014/main" id="{6904E23F-4F4C-6883-0247-537005388729}"/>
               </a:ext>
             </a:extLst>
           </p:cNvPr>
@@ -4329,16 +7135,12 @@
           <a:lstStyle/>
           <a:p>
             <a:r>
-              <a:rPr lang="en-US" dirty="0" err="1"/>
-              <a:t>Implementarea</a:t>
-            </a:r>
-            <a:r>
-              <a:rPr lang="en-US" dirty="0"/>
-              <a:t> </a:t>
-            </a:r>
-            <a:r>
-              <a:rPr lang="en-US" dirty="0" err="1"/>
-              <a:t>solutiei</a:t>
+              <a:rPr lang="en-US" dirty="0"/>
+              <a:t>Solutia </a:t>
+            </a:r>
+            <a:r>
+              <a:rPr lang="en-US" dirty="0" err="1"/>
+              <a:t>Aleasa</a:t>
             </a:r>
             <a:endParaRPr lang="ro-RO" dirty="0"/>
           </a:p>
@@ -4349,7 +7151,7 @@
           <p:cNvPr id="3" name="Content Placeholder 2">
             <a:extLst>
               <a:ext uri="{FF2B5EF4-FFF2-40B4-BE49-F238E27FC236}">
-                <a16:creationId xmlns:a16="http://schemas.microsoft.com/office/drawing/2014/main" id="{9131BEB1-C4A9-E428-C049-360B7CE0A617}"/>
+                <a16:creationId xmlns:a16="http://schemas.microsoft.com/office/drawing/2014/main" id="{7105036C-C24C-F59E-83AF-B69E1DD13616}"/>
               </a:ext>
             </a:extLst>
           </p:cNvPr>
@@ -4365,14 +7167,299 @@
           <a:bodyPr/>
           <a:lstStyle/>
           <a:p>
-            <a:endParaRPr lang="ro-RO"/>
+            <a:r>
+              <a:rPr lang="en-US" dirty="0"/>
+              <a:t>Un </a:t>
+            </a:r>
+            <a:r>
+              <a:rPr lang="en-US" dirty="0" err="1"/>
+              <a:t>sistem</a:t>
+            </a:r>
+            <a:r>
+              <a:rPr lang="en-US" dirty="0"/>
+              <a:t> de </a:t>
+            </a:r>
+            <a:r>
+              <a:rPr lang="en-US" dirty="0" err="1"/>
+              <a:t>monitorizare</a:t>
+            </a:r>
+            <a:r>
+              <a:rPr lang="en-US" dirty="0"/>
+              <a:t> a </a:t>
+            </a:r>
+            <a:r>
+              <a:rPr lang="en-US" dirty="0" err="1"/>
+              <a:t>calitatii</a:t>
+            </a:r>
+            <a:r>
+              <a:rPr lang="en-US" dirty="0"/>
+              <a:t> </a:t>
+            </a:r>
+            <a:r>
+              <a:rPr lang="en-US" dirty="0" err="1"/>
+              <a:t>aerului</a:t>
+            </a:r>
+            <a:r>
+              <a:rPr lang="en-US" dirty="0"/>
+              <a:t> </a:t>
+            </a:r>
+            <a:r>
+              <a:rPr lang="en-US" dirty="0" err="1"/>
+              <a:t>avand</a:t>
+            </a:r>
+            <a:r>
+              <a:rPr lang="en-US" dirty="0"/>
+              <a:t> </a:t>
+            </a:r>
+            <a:r>
+              <a:rPr lang="en-US" dirty="0" err="1"/>
+              <a:t>caracteristicile</a:t>
+            </a:r>
+            <a:r>
+              <a:rPr lang="en-US" dirty="0"/>
+              <a:t>:</a:t>
+            </a:r>
+          </a:p>
+          <a:p>
+            <a:pPr lvl="1"/>
+            <a:r>
+              <a:rPr lang="en-US" dirty="0" err="1"/>
+              <a:t>Senzori</a:t>
+            </a:r>
+            <a:r>
+              <a:rPr lang="en-US" dirty="0"/>
+              <a:t> </a:t>
+            </a:r>
+            <a:r>
+              <a:rPr lang="en-US" dirty="0" err="1"/>
+              <a:t>pentru</a:t>
+            </a:r>
+            <a:r>
+              <a:rPr lang="en-US" dirty="0"/>
+              <a:t> </a:t>
+            </a:r>
+            <a:r>
+              <a:rPr lang="en-US" dirty="0" err="1"/>
+              <a:t>esantionarea</a:t>
+            </a:r>
+            <a:r>
+              <a:rPr lang="en-US" dirty="0"/>
+              <a:t> </a:t>
+            </a:r>
+            <a:r>
+              <a:rPr lang="en-US" dirty="0" err="1"/>
+              <a:t>parametrilor</a:t>
+            </a:r>
+            <a:r>
+              <a:rPr lang="en-US" dirty="0"/>
+              <a:t> de </a:t>
+            </a:r>
+            <a:r>
+              <a:rPr lang="en-US" dirty="0" err="1"/>
+              <a:t>calitate</a:t>
+            </a:r>
+            <a:r>
+              <a:rPr lang="en-US" dirty="0"/>
+              <a:t> a </a:t>
+            </a:r>
+            <a:r>
+              <a:rPr lang="en-US" dirty="0" err="1"/>
+              <a:t>aerului</a:t>
+            </a:r>
+            <a:r>
+              <a:rPr lang="en-US" dirty="0"/>
+              <a:t>:</a:t>
+            </a:r>
+          </a:p>
+          <a:p>
+            <a:pPr lvl="2"/>
+            <a:r>
+              <a:rPr lang="en-US" dirty="0" err="1"/>
+              <a:t>Temperatura</a:t>
+            </a:r>
+            <a:r>
+              <a:rPr lang="en-US" dirty="0"/>
+              <a:t>, </a:t>
+            </a:r>
+            <a:r>
+              <a:rPr lang="en-US" dirty="0" err="1"/>
+              <a:t>Umiditate</a:t>
+            </a:r>
+            <a:r>
+              <a:rPr lang="en-US" dirty="0"/>
+              <a:t>, VOC, PM1.0, PM2.5, PM4.0, PM10.0, TPS</a:t>
+            </a:r>
+          </a:p>
+          <a:p>
+            <a:pPr lvl="1"/>
+            <a:r>
+              <a:rPr lang="en-US" dirty="0" err="1"/>
+              <a:t>Conexiune</a:t>
+            </a:r>
+            <a:r>
+              <a:rPr lang="en-US" dirty="0"/>
+              <a:t> Wi-Fi in </a:t>
+            </a:r>
+            <a:r>
+              <a:rPr lang="en-US" dirty="0" err="1"/>
+              <a:t>banda</a:t>
+            </a:r>
+            <a:r>
+              <a:rPr lang="en-US" dirty="0"/>
+              <a:t> de </a:t>
+            </a:r>
+            <a:r>
+              <a:rPr lang="en-US" dirty="0" err="1"/>
+              <a:t>frecventa</a:t>
+            </a:r>
+            <a:r>
+              <a:rPr lang="en-US" dirty="0"/>
+              <a:t> 2.4GHz</a:t>
+            </a:r>
+          </a:p>
+          <a:p>
+            <a:pPr lvl="1"/>
+            <a:r>
+              <a:rPr lang="en-US" dirty="0"/>
+              <a:t>Broker MQTT </a:t>
+            </a:r>
+            <a:r>
+              <a:rPr lang="en-US" dirty="0" err="1"/>
+              <a:t>pentru</a:t>
+            </a:r>
+            <a:r>
+              <a:rPr lang="en-US" dirty="0"/>
+              <a:t> </a:t>
+            </a:r>
+            <a:r>
+              <a:rPr lang="en-US" dirty="0" err="1"/>
+              <a:t>datele</a:t>
+            </a:r>
+            <a:r>
+              <a:rPr lang="en-US" dirty="0"/>
+              <a:t> in </a:t>
+            </a:r>
+            <a:r>
+              <a:rPr lang="en-US" dirty="0" err="1"/>
+              <a:t>timp</a:t>
+            </a:r>
+            <a:r>
+              <a:rPr lang="en-US" dirty="0"/>
+              <a:t> real</a:t>
+            </a:r>
+          </a:p>
+          <a:p>
+            <a:pPr lvl="1"/>
+            <a:r>
+              <a:rPr lang="en-US" dirty="0" err="1"/>
+              <a:t>Baza</a:t>
+            </a:r>
+            <a:r>
+              <a:rPr lang="en-US" dirty="0"/>
+              <a:t> de date MongoDB </a:t>
+            </a:r>
+            <a:r>
+              <a:rPr lang="en-US" dirty="0" err="1"/>
+              <a:t>pentru</a:t>
+            </a:r>
+            <a:r>
+              <a:rPr lang="en-US" dirty="0"/>
+              <a:t> </a:t>
+            </a:r>
+            <a:r>
+              <a:rPr lang="en-US" dirty="0" err="1"/>
+              <a:t>datele</a:t>
+            </a:r>
+            <a:r>
+              <a:rPr lang="en-US" dirty="0"/>
+              <a:t> </a:t>
+            </a:r>
+            <a:r>
+              <a:rPr lang="en-US" dirty="0" err="1"/>
+              <a:t>istorice</a:t>
+            </a:r>
+            <a:endParaRPr lang="en-US" dirty="0"/>
+          </a:p>
+          <a:p>
+            <a:pPr lvl="1"/>
+            <a:r>
+              <a:rPr lang="en-US" dirty="0"/>
+              <a:t>Server RESTful </a:t>
+            </a:r>
+            <a:r>
+              <a:rPr lang="en-US" dirty="0" err="1"/>
+              <a:t>pentru</a:t>
+            </a:r>
+            <a:r>
+              <a:rPr lang="en-US" dirty="0"/>
+              <a:t> </a:t>
+            </a:r>
+            <a:r>
+              <a:rPr lang="en-US" dirty="0" err="1"/>
+              <a:t>accesul</a:t>
+            </a:r>
+            <a:r>
+              <a:rPr lang="en-US" dirty="0"/>
+              <a:t> la </a:t>
+            </a:r>
+            <a:r>
+              <a:rPr lang="en-US" dirty="0" err="1"/>
+              <a:t>baza</a:t>
+            </a:r>
+            <a:r>
+              <a:rPr lang="en-US" dirty="0"/>
+              <a:t> de date</a:t>
+            </a:r>
+          </a:p>
+          <a:p>
+            <a:pPr lvl="1"/>
+            <a:r>
+              <a:rPr lang="en-US" dirty="0" err="1"/>
+              <a:t>Aplicatie</a:t>
+            </a:r>
+            <a:r>
+              <a:rPr lang="en-US" dirty="0"/>
+              <a:t> Android </a:t>
+            </a:r>
+            <a:r>
+              <a:rPr lang="en-US" dirty="0" err="1"/>
+              <a:t>reprezentand</a:t>
+            </a:r>
+            <a:r>
+              <a:rPr lang="en-US" dirty="0"/>
+              <a:t> </a:t>
+            </a:r>
+            <a:r>
+              <a:rPr lang="en-US" dirty="0" err="1"/>
+              <a:t>interfata</a:t>
+            </a:r>
+            <a:r>
+              <a:rPr lang="en-US" dirty="0"/>
+              <a:t> cu </a:t>
+            </a:r>
+            <a:r>
+              <a:rPr lang="en-US" dirty="0" err="1"/>
+              <a:t>utilizatorul</a:t>
+            </a:r>
+            <a:endParaRPr lang="en-US" dirty="0"/>
+          </a:p>
+          <a:p>
+            <a:pPr lvl="1"/>
+            <a:endParaRPr lang="en-US" dirty="0"/>
+          </a:p>
+          <a:p>
+            <a:pPr lvl="1"/>
+            <a:endParaRPr lang="en-US" dirty="0"/>
+          </a:p>
+          <a:p>
+            <a:endParaRPr lang="en-US" dirty="0"/>
           </a:p>
         </p:txBody>
       </p:sp>
     </p:spTree>
     <p:extLst>
       <p:ext uri="{BB962C8B-B14F-4D97-AF65-F5344CB8AC3E}">
-        <p14:creationId xmlns:p14="http://schemas.microsoft.com/office/powerpoint/2010/main" val="1392760137"/>
+        <p14:creationId xmlns:p14="http://schemas.microsoft.com/office/powerpoint/2010/main" val="820083394"/>
       </p:ext>
     </p:extLst>
   </p:cSld>
@@ -4401,10 +7488,10 @@
       </p:grpSpPr>
       <p:sp>
         <p:nvSpPr>
-          <p:cNvPr id="2" name="Title 1">
-            <a:extLst>
-              <a:ext uri="{FF2B5EF4-FFF2-40B4-BE49-F238E27FC236}">
-                <a16:creationId xmlns:a16="http://schemas.microsoft.com/office/drawing/2014/main" id="{B9DAA0C3-85C1-956C-1F71-77B73911381A}"/>
+          <p:cNvPr id="6" name="Title 5">
+            <a:extLst>
+              <a:ext uri="{FF2B5EF4-FFF2-40B4-BE49-F238E27FC236}">
+                <a16:creationId xmlns:a16="http://schemas.microsoft.com/office/drawing/2014/main" id="{9B89977B-53E7-F06C-DA1B-0B69FE4E5CCE}"/>
               </a:ext>
             </a:extLst>
           </p:cNvPr>
@@ -4421,54 +7508,60 @@
           <a:lstStyle/>
           <a:p>
             <a:r>
-              <a:rPr lang="en-US" dirty="0"/>
-              <a:t>Teste </a:t>
-            </a:r>
-            <a:r>
-              <a:rPr lang="en-US" dirty="0" err="1"/>
-              <a:t>si</a:t>
-            </a:r>
-            <a:r>
-              <a:rPr lang="en-US" dirty="0"/>
-              <a:t> </a:t>
-            </a:r>
-            <a:r>
-              <a:rPr lang="en-US" dirty="0" err="1"/>
-              <a:t>rezultate</a:t>
+              <a:rPr lang="en-US" dirty="0" err="1"/>
+              <a:t>Arhitectura</a:t>
+            </a:r>
+            <a:r>
+              <a:rPr lang="en-US" dirty="0"/>
+              <a:t> </a:t>
+            </a:r>
+            <a:r>
+              <a:rPr lang="en-US" dirty="0" err="1"/>
+              <a:t>sistemului</a:t>
             </a:r>
             <a:endParaRPr lang="ro-RO" dirty="0"/>
           </a:p>
         </p:txBody>
       </p:sp>
-      <p:sp>
-        <p:nvSpPr>
-          <p:cNvPr id="3" name="Content Placeholder 2">
-            <a:extLst>
-              <a:ext uri="{FF2B5EF4-FFF2-40B4-BE49-F238E27FC236}">
-                <a16:creationId xmlns:a16="http://schemas.microsoft.com/office/drawing/2014/main" id="{2AB9D4FD-FA42-282B-2C51-880BADDA3F35}"/>
-              </a:ext>
-            </a:extLst>
-          </p:cNvPr>
-          <p:cNvSpPr>
-            <a:spLocks noGrp="1"/>
-          </p:cNvSpPr>
+      <p:pic>
+        <p:nvPicPr>
+          <p:cNvPr id="9" name="Content Placeholder 8" descr="A diagram of a computer network&#10;&#10;Description automatically generated">
+            <a:extLst>
+              <a:ext uri="{FF2B5EF4-FFF2-40B4-BE49-F238E27FC236}">
+                <a16:creationId xmlns:a16="http://schemas.microsoft.com/office/drawing/2014/main" id="{01E29D76-DB5B-A774-3B55-E2DDE0E391C1}"/>
+              </a:ext>
+            </a:extLst>
+          </p:cNvPr>
+          <p:cNvPicPr>
+            <a:picLocks noGrp="1" noChangeAspect="1"/>
+          </p:cNvPicPr>
           <p:nvPr>
             <p:ph idx="1"/>
           </p:nvPr>
-        </p:nvSpPr>
-        <p:spPr/>
-        <p:txBody>
-          <a:bodyPr/>
-          <a:lstStyle/>
-          <a:p>
-            <a:endParaRPr lang="ro-RO"/>
-          </a:p>
-        </p:txBody>
-      </p:sp>
+        </p:nvPicPr>
+        <p:blipFill>
+          <a:blip r:embed="rId2">
+            <a:extLst>
+              <a:ext uri="{28A0092B-C50C-407E-A947-70E740481C1C}">
+                <a14:useLocalDpi xmlns:a14="http://schemas.microsoft.com/office/drawing/2010/main" val="0"/>
+              </a:ext>
+            </a:extLst>
+          </a:blip>
+          <a:stretch>
+            <a:fillRect/>
+          </a:stretch>
+        </p:blipFill>
+        <p:spPr>
+          <a:xfrm>
+            <a:off x="760536" y="1790894"/>
+            <a:ext cx="10762769" cy="3591719"/>
+          </a:xfrm>
+        </p:spPr>
+      </p:pic>
     </p:spTree>
     <p:extLst>
       <p:ext uri="{BB962C8B-B14F-4D97-AF65-F5344CB8AC3E}">
-        <p14:creationId xmlns:p14="http://schemas.microsoft.com/office/powerpoint/2010/main" val="1167266706"/>
+        <p14:creationId xmlns:p14="http://schemas.microsoft.com/office/powerpoint/2010/main" val="1312404625"/>
       </p:ext>
     </p:extLst>
   </p:cSld>
@@ -4500,7 +7593,7 @@
           <p:cNvPr id="2" name="Title 1">
             <a:extLst>
               <a:ext uri="{FF2B5EF4-FFF2-40B4-BE49-F238E27FC236}">
-                <a16:creationId xmlns:a16="http://schemas.microsoft.com/office/drawing/2014/main" id="{7ED5A5CB-42BA-4E52-0E3D-2E6ED4C00485}"/>
+                <a16:creationId xmlns:a16="http://schemas.microsoft.com/office/drawing/2014/main" id="{7B571AD9-9B66-2B23-F69E-0E08C2BDC9FF}"/>
               </a:ext>
             </a:extLst>
           </p:cNvPr>
@@ -4518,41 +7611,59 @@
           <a:p>
             <a:r>
               <a:rPr lang="en-US" dirty="0" err="1"/>
-              <a:t>Concluzii</a:t>
+              <a:t>Arhitectura</a:t>
+            </a:r>
+            <a:r>
+              <a:rPr lang="en-US" dirty="0"/>
+              <a:t> </a:t>
+            </a:r>
+            <a:r>
+              <a:rPr lang="en-US" dirty="0" err="1"/>
+              <a:t>senzorului</a:t>
             </a:r>
             <a:endParaRPr lang="ro-RO" dirty="0"/>
           </a:p>
         </p:txBody>
       </p:sp>
-      <p:sp>
-        <p:nvSpPr>
-          <p:cNvPr id="3" name="Content Placeholder 2">
-            <a:extLst>
-              <a:ext uri="{FF2B5EF4-FFF2-40B4-BE49-F238E27FC236}">
-                <a16:creationId xmlns:a16="http://schemas.microsoft.com/office/drawing/2014/main" id="{930DA853-5CBC-7D9C-4AA8-86831CB8CE33}"/>
-              </a:ext>
-            </a:extLst>
-          </p:cNvPr>
-          <p:cNvSpPr>
-            <a:spLocks noGrp="1"/>
-          </p:cNvSpPr>
+      <p:pic>
+        <p:nvPicPr>
+          <p:cNvPr id="5" name="Content Placeholder 4" descr="A diagram of a computer&#10;&#10;Description automatically generated">
+            <a:extLst>
+              <a:ext uri="{FF2B5EF4-FFF2-40B4-BE49-F238E27FC236}">
+                <a16:creationId xmlns:a16="http://schemas.microsoft.com/office/drawing/2014/main" id="{6A8AAF79-8457-DDF1-A47F-6A68802E4814}"/>
+              </a:ext>
+            </a:extLst>
+          </p:cNvPr>
+          <p:cNvPicPr>
+            <a:picLocks noGrp="1" noChangeAspect="1"/>
+          </p:cNvPicPr>
           <p:nvPr>
             <p:ph idx="1"/>
           </p:nvPr>
-        </p:nvSpPr>
-        <p:spPr/>
-        <p:txBody>
-          <a:bodyPr/>
-          <a:lstStyle/>
-          <a:p>
-            <a:endParaRPr lang="ro-RO"/>
-          </a:p>
-        </p:txBody>
-      </p:sp>
+        </p:nvPicPr>
+        <p:blipFill>
+          <a:blip r:embed="rId2">
+            <a:extLst>
+              <a:ext uri="{28A0092B-C50C-407E-A947-70E740481C1C}">
+                <a14:useLocalDpi xmlns:a14="http://schemas.microsoft.com/office/drawing/2010/main" val="0"/>
+              </a:ext>
+            </a:extLst>
+          </a:blip>
+          <a:stretch>
+            <a:fillRect/>
+          </a:stretch>
+        </p:blipFill>
+        <p:spPr>
+          <a:xfrm>
+            <a:off x="899626" y="1828007"/>
+            <a:ext cx="10392747" cy="4480225"/>
+          </a:xfrm>
+        </p:spPr>
+      </p:pic>
     </p:spTree>
     <p:extLst>
       <p:ext uri="{BB962C8B-B14F-4D97-AF65-F5344CB8AC3E}">
-        <p14:creationId xmlns:p14="http://schemas.microsoft.com/office/powerpoint/2010/main" val="736913998"/>
+        <p14:creationId xmlns:p14="http://schemas.microsoft.com/office/powerpoint/2010/main" val="131595779"/>
       </p:ext>
     </p:extLst>
   </p:cSld>

</xml_diff>